<commit_message>
completed till abstraction 2 :)
</commit_message>
<xml_diff>
--- a/Transformers/blog_resources/graphics/CNN attention.pptx
+++ b/Transformers/blog_resources/graphics/CNN attention.pptx
@@ -5756,190 +5756,6 @@
       </p:grpSp>
       <p:sp>
         <p:nvSpPr>
-          <p:cNvPr id="110" name="Rectangle 109">
-            <a:extLst>
-              <a:ext uri="{FF2B5EF4-FFF2-40B4-BE49-F238E27FC236}">
-                <a16:creationId xmlns:a16="http://schemas.microsoft.com/office/drawing/2014/main" id="{AC6C1CBE-DF5E-486D-A2BE-3B31809B0ADD}"/>
-              </a:ext>
-            </a:extLst>
-          </p:cNvPr>
-          <p:cNvSpPr/>
-          <p:nvPr/>
-        </p:nvSpPr>
-        <p:spPr>
-          <a:xfrm>
-            <a:off x="7159963" y="3265100"/>
-            <a:ext cx="81874" cy="80465"/>
-          </a:xfrm>
-          <a:prstGeom prst="rect">
-            <a:avLst/>
-          </a:prstGeom>
-        </p:spPr>
-        <p:style>
-          <a:lnRef idx="2">
-            <a:schemeClr val="accent1">
-              <a:shade val="50000"/>
-            </a:schemeClr>
-          </a:lnRef>
-          <a:fillRef idx="1">
-            <a:schemeClr val="accent1"/>
-          </a:fillRef>
-          <a:effectRef idx="0">
-            <a:schemeClr val="accent1"/>
-          </a:effectRef>
-          <a:fontRef idx="minor">
-            <a:schemeClr val="lt1"/>
-          </a:fontRef>
-        </p:style>
-        <p:txBody>
-          <a:bodyPr rtlCol="0" anchor="ctr"/>
-          <a:lstStyle/>
-          <a:p>
-            <a:pPr algn="ctr"/>
-            <a:endParaRPr lang="en-GB"/>
-          </a:p>
-        </p:txBody>
-      </p:sp>
-      <p:sp>
-        <p:nvSpPr>
-          <p:cNvPr id="111" name="Rectangle 110">
-            <a:extLst>
-              <a:ext uri="{FF2B5EF4-FFF2-40B4-BE49-F238E27FC236}">
-                <a16:creationId xmlns:a16="http://schemas.microsoft.com/office/drawing/2014/main" id="{ABDB0E98-3338-4977-B589-D8BC346A4609}"/>
-              </a:ext>
-            </a:extLst>
-          </p:cNvPr>
-          <p:cNvSpPr/>
-          <p:nvPr/>
-        </p:nvSpPr>
-        <p:spPr>
-          <a:xfrm>
-            <a:off x="7154218" y="3495160"/>
-            <a:ext cx="81874" cy="80465"/>
-          </a:xfrm>
-          <a:prstGeom prst="rect">
-            <a:avLst/>
-          </a:prstGeom>
-        </p:spPr>
-        <p:style>
-          <a:lnRef idx="2">
-            <a:schemeClr val="accent1">
-              <a:shade val="50000"/>
-            </a:schemeClr>
-          </a:lnRef>
-          <a:fillRef idx="1">
-            <a:schemeClr val="accent1"/>
-          </a:fillRef>
-          <a:effectRef idx="0">
-            <a:schemeClr val="accent1"/>
-          </a:effectRef>
-          <a:fontRef idx="minor">
-            <a:schemeClr val="lt1"/>
-          </a:fontRef>
-        </p:style>
-        <p:txBody>
-          <a:bodyPr rtlCol="0" anchor="ctr"/>
-          <a:lstStyle/>
-          <a:p>
-            <a:pPr algn="ctr"/>
-            <a:endParaRPr lang="en-GB"/>
-          </a:p>
-        </p:txBody>
-      </p:sp>
-      <p:sp>
-        <p:nvSpPr>
-          <p:cNvPr id="112" name="Rectangle 111">
-            <a:extLst>
-              <a:ext uri="{FF2B5EF4-FFF2-40B4-BE49-F238E27FC236}">
-                <a16:creationId xmlns:a16="http://schemas.microsoft.com/office/drawing/2014/main" id="{1146BF9F-9355-45C7-B09E-468B750919B0}"/>
-              </a:ext>
-            </a:extLst>
-          </p:cNvPr>
-          <p:cNvSpPr/>
-          <p:nvPr/>
-        </p:nvSpPr>
-        <p:spPr>
-          <a:xfrm>
-            <a:off x="7154218" y="3725220"/>
-            <a:ext cx="81874" cy="80465"/>
-          </a:xfrm>
-          <a:prstGeom prst="rect">
-            <a:avLst/>
-          </a:prstGeom>
-        </p:spPr>
-        <p:style>
-          <a:lnRef idx="2">
-            <a:schemeClr val="accent1">
-              <a:shade val="50000"/>
-            </a:schemeClr>
-          </a:lnRef>
-          <a:fillRef idx="1">
-            <a:schemeClr val="accent1"/>
-          </a:fillRef>
-          <a:effectRef idx="0">
-            <a:schemeClr val="accent1"/>
-          </a:effectRef>
-          <a:fontRef idx="minor">
-            <a:schemeClr val="lt1"/>
-          </a:fontRef>
-        </p:style>
-        <p:txBody>
-          <a:bodyPr rtlCol="0" anchor="ctr"/>
-          <a:lstStyle/>
-          <a:p>
-            <a:pPr algn="ctr"/>
-            <a:endParaRPr lang="en-GB"/>
-          </a:p>
-        </p:txBody>
-      </p:sp>
-      <p:sp>
-        <p:nvSpPr>
-          <p:cNvPr id="113" name="Rectangle 112">
-            <a:extLst>
-              <a:ext uri="{FF2B5EF4-FFF2-40B4-BE49-F238E27FC236}">
-                <a16:creationId xmlns:a16="http://schemas.microsoft.com/office/drawing/2014/main" id="{EDED5933-3640-48E4-85F5-C0715CEA83CF}"/>
-              </a:ext>
-            </a:extLst>
-          </p:cNvPr>
-          <p:cNvSpPr/>
-          <p:nvPr/>
-        </p:nvSpPr>
-        <p:spPr>
-          <a:xfrm>
-            <a:off x="7154218" y="3954357"/>
-            <a:ext cx="81874" cy="80465"/>
-          </a:xfrm>
-          <a:prstGeom prst="rect">
-            <a:avLst/>
-          </a:prstGeom>
-        </p:spPr>
-        <p:style>
-          <a:lnRef idx="2">
-            <a:schemeClr val="accent1">
-              <a:shade val="50000"/>
-            </a:schemeClr>
-          </a:lnRef>
-          <a:fillRef idx="1">
-            <a:schemeClr val="accent1"/>
-          </a:fillRef>
-          <a:effectRef idx="0">
-            <a:schemeClr val="accent1"/>
-          </a:effectRef>
-          <a:fontRef idx="minor">
-            <a:schemeClr val="lt1"/>
-          </a:fontRef>
-        </p:style>
-        <p:txBody>
-          <a:bodyPr rtlCol="0" anchor="ctr"/>
-          <a:lstStyle/>
-          <a:p>
-            <a:pPr algn="ctr"/>
-            <a:endParaRPr lang="en-GB"/>
-          </a:p>
-        </p:txBody>
-      </p:sp>
-      <p:sp>
-        <p:nvSpPr>
           <p:cNvPr id="114" name="Rectangle 113">
             <a:extLst>
               <a:ext uri="{FF2B5EF4-FFF2-40B4-BE49-F238E27FC236}">
@@ -7389,7 +7205,7 @@
         </p:nvSpPr>
         <p:spPr>
           <a:xfrm>
-            <a:off x="3873786" y="2234727"/>
+            <a:off x="3825004" y="2234727"/>
             <a:ext cx="1797546" cy="307777"/>
           </a:xfrm>
           <a:prstGeom prst="rect">
@@ -8110,6 +7926,78 @@
           </a:p>
         </p:txBody>
       </p:sp>
+      <p:sp>
+        <p:nvSpPr>
+          <p:cNvPr id="2" name="TextBox 1">
+            <a:extLst>
+              <a:ext uri="{FF2B5EF4-FFF2-40B4-BE49-F238E27FC236}">
+                <a16:creationId xmlns:a16="http://schemas.microsoft.com/office/drawing/2014/main" id="{2278B22A-ADDC-47FE-8108-3FF52AE4AE93}"/>
+              </a:ext>
+            </a:extLst>
+          </p:cNvPr>
+          <p:cNvSpPr txBox="1"/>
+          <p:nvPr/>
+        </p:nvSpPr>
+        <p:spPr>
+          <a:xfrm>
+            <a:off x="4951138" y="1133594"/>
+            <a:ext cx="2167888" cy="461665"/>
+          </a:xfrm>
+          <a:prstGeom prst="rect">
+            <a:avLst/>
+          </a:prstGeom>
+          <a:noFill/>
+        </p:spPr>
+        <p:txBody>
+          <a:bodyPr wrap="square" rtlCol="0">
+            <a:spAutoFit/>
+          </a:bodyPr>
+          <a:lstStyle/>
+          <a:p>
+            <a:r>
+              <a:rPr lang="en-US" sz="1200" dirty="0"/>
+              <a:t>Compute the grid of attention weights w.r.t each input feature</a:t>
+            </a:r>
+            <a:endParaRPr lang="en-GB" sz="1200" dirty="0"/>
+          </a:p>
+        </p:txBody>
+      </p:sp>
+      <p:sp>
+        <p:nvSpPr>
+          <p:cNvPr id="3" name="TextBox 2">
+            <a:extLst>
+              <a:ext uri="{FF2B5EF4-FFF2-40B4-BE49-F238E27FC236}">
+                <a16:creationId xmlns:a16="http://schemas.microsoft.com/office/drawing/2014/main" id="{0340FC62-CB7B-47A0-A64E-2C7978CE5424}"/>
+              </a:ext>
+            </a:extLst>
+          </p:cNvPr>
+          <p:cNvSpPr txBox="1"/>
+          <p:nvPr/>
+        </p:nvSpPr>
+        <p:spPr>
+          <a:xfrm>
+            <a:off x="6536108" y="2778710"/>
+            <a:ext cx="2024867" cy="276999"/>
+          </a:xfrm>
+          <a:prstGeom prst="rect">
+            <a:avLst/>
+          </a:prstGeom>
+          <a:noFill/>
+        </p:spPr>
+        <p:txBody>
+          <a:bodyPr wrap="square" rtlCol="0">
+            <a:spAutoFit/>
+          </a:bodyPr>
+          <a:lstStyle/>
+          <a:p>
+            <a:r>
+              <a:rPr lang="en-US" sz="1200" dirty="0"/>
+              <a:t>Compute weighted averages</a:t>
+            </a:r>
+            <a:endParaRPr lang="en-GB" sz="1200" dirty="0"/>
+          </a:p>
+        </p:txBody>
+      </p:sp>
     </p:spTree>
     <p:extLst>
       <p:ext uri="{BB962C8B-B14F-4D97-AF65-F5344CB8AC3E}">
@@ -8132,6 +8020,9 @@
                     <p:cTn id="3" fill="hold">
                       <p:stCondLst>
                         <p:cond delay="indefinite"/>
+                        <p:cond evt="onBegin" delay="0">
+                          <p:tn val="2"/>
+                        </p:cond>
                       </p:stCondLst>
                       <p:childTnLst>
                         <p:par>
@@ -8141,7 +8032,7 @@
                             </p:stCondLst>
                             <p:childTnLst>
                               <p:par>
-                                <p:cTn id="5" presetID="26" presetClass="emph" presetSubtype="0" repeatCount="3000" fill="hold" grpId="0" nodeType="clickEffect">
+                                <p:cTn id="5" presetID="26" presetClass="emph" presetSubtype="0" repeatCount="3000" fill="hold" grpId="0" nodeType="afterEffect">
                                   <p:stCondLst>
                                     <p:cond delay="0"/>
                                   </p:stCondLst>
@@ -8169,30 +8060,21 @@
                             </p:childTnLst>
                           </p:cTn>
                         </p:par>
-                      </p:childTnLst>
-                    </p:cTn>
-                  </p:par>
-                  <p:par>
-                    <p:cTn id="8" fill="hold">
-                      <p:stCondLst>
-                        <p:cond delay="indefinite"/>
-                      </p:stCondLst>
-                      <p:childTnLst>
                         <p:par>
-                          <p:cTn id="9" fill="hold">
+                          <p:cTn id="8" fill="hold">
                             <p:stCondLst>
-                              <p:cond delay="0"/>
+                              <p:cond delay="1500"/>
                             </p:stCondLst>
                             <p:childTnLst>
                               <p:par>
-                                <p:cTn id="10" presetID="22" presetClass="entr" presetSubtype="4" fill="hold" nodeType="clickEffect">
+                                <p:cTn id="9" presetID="22" presetClass="entr" presetSubtype="4" fill="hold" nodeType="afterEffect">
                                   <p:stCondLst>
                                     <p:cond delay="0"/>
                                   </p:stCondLst>
                                   <p:childTnLst>
                                     <p:set>
                                       <p:cBhvr>
-                                        <p:cTn id="11" dur="1" fill="hold">
+                                        <p:cTn id="10" dur="1" fill="hold">
                                           <p:stCondLst>
                                             <p:cond delay="0"/>
                                           </p:stCondLst>
@@ -8210,7 +8092,7 @@
                                     </p:set>
                                     <p:animEffect transition="in" filter="wipe(down)">
                                       <p:cBhvr>
-                                        <p:cTn id="12" dur="500"/>
+                                        <p:cTn id="11" dur="500"/>
                                         <p:tgtEl>
                                           <p:spTgt spid="56"/>
                                         </p:tgtEl>
@@ -8222,30 +8104,21 @@
                             </p:childTnLst>
                           </p:cTn>
                         </p:par>
-                      </p:childTnLst>
-                    </p:cTn>
-                  </p:par>
-                  <p:par>
-                    <p:cTn id="13" fill="hold">
-                      <p:stCondLst>
-                        <p:cond delay="indefinite"/>
-                      </p:stCondLst>
-                      <p:childTnLst>
                         <p:par>
-                          <p:cTn id="14" fill="hold">
+                          <p:cTn id="12" fill="hold">
                             <p:stCondLst>
-                              <p:cond delay="0"/>
+                              <p:cond delay="2000"/>
                             </p:stCondLst>
                             <p:childTnLst>
                               <p:par>
-                                <p:cTn id="15" presetID="10" presetClass="entr" presetSubtype="0" fill="hold" nodeType="clickEffect">
+                                <p:cTn id="13" presetID="10" presetClass="entr" presetSubtype="0" fill="hold" nodeType="afterEffect">
                                   <p:stCondLst>
                                     <p:cond delay="0"/>
                                   </p:stCondLst>
                                   <p:childTnLst>
                                     <p:set>
                                       <p:cBhvr>
-                                        <p:cTn id="16" dur="1" fill="hold">
+                                        <p:cTn id="14" dur="1" fill="hold">
                                           <p:stCondLst>
                                             <p:cond delay="0"/>
                                           </p:stCondLst>
@@ -8263,7 +8136,7 @@
                                     </p:set>
                                     <p:animEffect transition="in" filter="fade">
                                       <p:cBhvr>
-                                        <p:cTn id="17" dur="500"/>
+                                        <p:cTn id="15" dur="500"/>
                                         <p:tgtEl>
                                           <p:spTgt spid="60"/>
                                         </p:tgtEl>
@@ -8275,23 +8148,14 @@
                             </p:childTnLst>
                           </p:cTn>
                         </p:par>
-                      </p:childTnLst>
-                    </p:cTn>
-                  </p:par>
-                  <p:par>
-                    <p:cTn id="18" fill="hold">
-                      <p:stCondLst>
-                        <p:cond delay="indefinite"/>
-                      </p:stCondLst>
-                      <p:childTnLst>
                         <p:par>
-                          <p:cTn id="19" fill="hold">
+                          <p:cTn id="16" fill="hold">
                             <p:stCondLst>
-                              <p:cond delay="0"/>
+                              <p:cond delay="2500"/>
                             </p:stCondLst>
                             <p:childTnLst>
                               <p:par>
-                                <p:cTn id="20" presetID="10" presetClass="entr" presetSubtype="0" fill="hold" grpId="0" nodeType="clickEffect">
+                                <p:cTn id="17" presetID="10" presetClass="entr" presetSubtype="0" fill="hold" grpId="0" nodeType="afterEffect">
                                   <p:stCondLst>
                                     <p:cond delay="0"/>
                                   </p:stCondLst>
@@ -8301,7 +8165,7 @@
                                   <p:childTnLst>
                                     <p:set>
                                       <p:cBhvr>
-                                        <p:cTn id="21" dur="1" fill="hold">
+                                        <p:cTn id="18" dur="1" fill="hold">
                                           <p:stCondLst>
                                             <p:cond delay="0"/>
                                           </p:stCondLst>
@@ -8319,7 +8183,7 @@
                                     </p:set>
                                     <p:animEffect transition="in" filter="fade">
                                       <p:cBhvr>
-                                        <p:cTn id="22" dur="500"/>
+                                        <p:cTn id="19" dur="500"/>
                                         <p:tgtEl>
                                           <p:spTgt spid="146"/>
                                         </p:tgtEl>
@@ -8331,23 +8195,14 @@
                             </p:childTnLst>
                           </p:cTn>
                         </p:par>
-                      </p:childTnLst>
-                    </p:cTn>
-                  </p:par>
-                  <p:par>
-                    <p:cTn id="23" fill="hold">
-                      <p:stCondLst>
-                        <p:cond delay="indefinite"/>
-                      </p:stCondLst>
-                      <p:childTnLst>
                         <p:par>
-                          <p:cTn id="24" fill="hold">
+                          <p:cTn id="20" fill="hold">
                             <p:stCondLst>
-                              <p:cond delay="0"/>
+                              <p:cond delay="3950"/>
                             </p:stCondLst>
                             <p:childTnLst>
                               <p:par>
-                                <p:cTn id="25" presetID="10" presetClass="entr" presetSubtype="0" fill="hold" grpId="0" nodeType="clickEffect">
+                                <p:cTn id="21" presetID="10" presetClass="entr" presetSubtype="0" fill="hold" grpId="0" nodeType="afterEffect">
                                   <p:stCondLst>
                                     <p:cond delay="0"/>
                                   </p:stCondLst>
@@ -8357,7 +8212,7 @@
                                   <p:childTnLst>
                                     <p:set>
                                       <p:cBhvr>
-                                        <p:cTn id="26" dur="1" fill="hold">
+                                        <p:cTn id="22" dur="1" fill="hold">
                                           <p:stCondLst>
                                             <p:cond delay="0"/>
                                           </p:stCondLst>
@@ -8375,7 +8230,7 @@
                                     </p:set>
                                     <p:animEffect transition="in" filter="fade">
                                       <p:cBhvr>
-                                        <p:cTn id="27" dur="500"/>
+                                        <p:cTn id="23" dur="500"/>
                                         <p:tgtEl>
                                           <p:spTgt spid="148"/>
                                         </p:tgtEl>
@@ -8387,30 +8242,21 @@
                             </p:childTnLst>
                           </p:cTn>
                         </p:par>
-                      </p:childTnLst>
-                    </p:cTn>
-                  </p:par>
-                  <p:par>
-                    <p:cTn id="28" fill="hold">
-                      <p:stCondLst>
-                        <p:cond delay="indefinite"/>
-                      </p:stCondLst>
-                      <p:childTnLst>
                         <p:par>
-                          <p:cTn id="29" fill="hold">
+                          <p:cTn id="24" fill="hold">
                             <p:stCondLst>
-                              <p:cond delay="0"/>
+                              <p:cond delay="5250"/>
                             </p:stCondLst>
                             <p:childTnLst>
                               <p:par>
-                                <p:cTn id="30" presetID="10" presetClass="entr" presetSubtype="0" fill="hold" nodeType="clickEffect">
+                                <p:cTn id="25" presetID="10" presetClass="entr" presetSubtype="0" fill="hold" nodeType="afterEffect">
                                   <p:stCondLst>
                                     <p:cond delay="0"/>
                                   </p:stCondLst>
                                   <p:childTnLst>
                                     <p:set>
                                       <p:cBhvr>
-                                        <p:cTn id="31" dur="1" fill="hold">
+                                        <p:cTn id="26" dur="1" fill="hold">
                                           <p:stCondLst>
                                             <p:cond delay="0"/>
                                           </p:stCondLst>
@@ -8428,7 +8274,7 @@
                                     </p:set>
                                     <p:animEffect transition="in" filter="fade">
                                       <p:cBhvr>
-                                        <p:cTn id="32" dur="500"/>
+                                        <p:cTn id="27" dur="500"/>
                                         <p:tgtEl>
                                           <p:spTgt spid="92"/>
                                         </p:tgtEl>
@@ -8440,30 +8286,21 @@
                             </p:childTnLst>
                           </p:cTn>
                         </p:par>
-                      </p:childTnLst>
-                    </p:cTn>
-                  </p:par>
-                  <p:par>
-                    <p:cTn id="33" fill="hold">
-                      <p:stCondLst>
-                        <p:cond delay="indefinite"/>
-                      </p:stCondLst>
-                      <p:childTnLst>
                         <p:par>
-                          <p:cTn id="34" fill="hold">
+                          <p:cTn id="28" fill="hold">
                             <p:stCondLst>
-                              <p:cond delay="0"/>
+                              <p:cond delay="5750"/>
                             </p:stCondLst>
                             <p:childTnLst>
                               <p:par>
-                                <p:cTn id="35" presetID="22" presetClass="entr" presetSubtype="4" fill="hold" nodeType="clickEffect">
+                                <p:cTn id="29" presetID="22" presetClass="entr" presetSubtype="4" fill="hold" nodeType="afterEffect">
                                   <p:stCondLst>
                                     <p:cond delay="0"/>
                                   </p:stCondLst>
                                   <p:childTnLst>
                                     <p:set>
                                       <p:cBhvr>
-                                        <p:cTn id="36" dur="1" fill="hold">
+                                        <p:cTn id="30" dur="1" fill="hold">
                                           <p:stCondLst>
                                             <p:cond delay="0"/>
                                           </p:stCondLst>
@@ -8481,7 +8318,7 @@
                                     </p:set>
                                     <p:animEffect transition="in" filter="wipe(down)">
                                       <p:cBhvr>
-                                        <p:cTn id="37" dur="500"/>
+                                        <p:cTn id="31" dur="500"/>
                                         <p:tgtEl>
                                           <p:spTgt spid="94"/>
                                         </p:tgtEl>
@@ -8493,36 +8330,30 @@
                             </p:childTnLst>
                           </p:cTn>
                         </p:par>
-                      </p:childTnLst>
-                    </p:cTn>
-                  </p:par>
-                  <p:par>
-                    <p:cTn id="38" fill="hold">
-                      <p:stCondLst>
-                        <p:cond delay="indefinite"/>
-                      </p:stCondLst>
-                      <p:childTnLst>
                         <p:par>
-                          <p:cTn id="39" fill="hold">
+                          <p:cTn id="32" fill="hold">
                             <p:stCondLst>
-                              <p:cond delay="0"/>
+                              <p:cond delay="6250"/>
                             </p:stCondLst>
                             <p:childTnLst>
                               <p:par>
-                                <p:cTn id="40" presetID="22" presetClass="entr" presetSubtype="4" fill="hold" nodeType="clickEffect">
+                                <p:cTn id="33" presetID="10" presetClass="entr" presetSubtype="0" fill="hold" grpId="0" nodeType="afterEffect">
                                   <p:stCondLst>
                                     <p:cond delay="0"/>
                                   </p:stCondLst>
+                                  <p:iterate type="lt">
+                                    <p:tmPct val="10000"/>
+                                  </p:iterate>
                                   <p:childTnLst>
                                     <p:set>
                                       <p:cBhvr>
-                                        <p:cTn id="41" dur="1" fill="hold">
+                                        <p:cTn id="34" dur="1" fill="hold">
                                           <p:stCondLst>
                                             <p:cond delay="0"/>
                                           </p:stCondLst>
                                         </p:cTn>
                                         <p:tgtEl>
-                                          <p:spTgt spid="63"/>
+                                          <p:spTgt spid="2"/>
                                         </p:tgtEl>
                                         <p:attrNameLst>
                                           <p:attrName>style.visibility</p:attrName>
@@ -8532,11 +8363,11 @@
                                         <p:strVal val="visible"/>
                                       </p:to>
                                     </p:set>
-                                    <p:animEffect transition="in" filter="wipe(down)">
-                                      <p:cBhvr>
-                                        <p:cTn id="42" dur="500"/>
-                                        <p:tgtEl>
-                                          <p:spTgt spid="63"/>
+                                    <p:animEffect transition="in" filter="fade">
+                                      <p:cBhvr>
+                                        <p:cTn id="35" dur="500"/>
+                                        <p:tgtEl>
+                                          <p:spTgt spid="2"/>
                                         </p:tgtEl>
                                       </p:cBhvr>
                                     </p:animEffect>
@@ -8546,30 +8377,65 @@
                             </p:childTnLst>
                           </p:cTn>
                         </p:par>
-                      </p:childTnLst>
-                    </p:cTn>
-                  </p:par>
-                  <p:par>
-                    <p:cTn id="43" fill="hold">
-                      <p:stCondLst>
-                        <p:cond delay="indefinite"/>
-                      </p:stCondLst>
-                      <p:childTnLst>
                         <p:par>
-                          <p:cTn id="44" fill="hold">
+                          <p:cTn id="36" fill="hold">
                             <p:stCondLst>
-                              <p:cond delay="0"/>
+                              <p:cond delay="9350"/>
                             </p:stCondLst>
                             <p:childTnLst>
                               <p:par>
-                                <p:cTn id="45" presetID="26" presetClass="emph" presetSubtype="0" fill="hold" grpId="0" nodeType="clickEffect">
+                                <p:cTn id="37" presetID="22" presetClass="entr" presetSubtype="4" fill="hold" nodeType="afterEffect">
+                                  <p:stCondLst>
+                                    <p:cond delay="0"/>
+                                  </p:stCondLst>
+                                  <p:childTnLst>
+                                    <p:set>
+                                      <p:cBhvr>
+                                        <p:cTn id="38" dur="1" fill="hold">
+                                          <p:stCondLst>
+                                            <p:cond delay="0"/>
+                                          </p:stCondLst>
+                                        </p:cTn>
+                                        <p:tgtEl>
+                                          <p:spTgt spid="63"/>
+                                        </p:tgtEl>
+                                        <p:attrNameLst>
+                                          <p:attrName>style.visibility</p:attrName>
+                                        </p:attrNameLst>
+                                      </p:cBhvr>
+                                      <p:to>
+                                        <p:strVal val="visible"/>
+                                      </p:to>
+                                    </p:set>
+                                    <p:animEffect transition="in" filter="wipe(down)">
+                                      <p:cBhvr>
+                                        <p:cTn id="39" dur="500"/>
+                                        <p:tgtEl>
+                                          <p:spTgt spid="63"/>
+                                        </p:tgtEl>
+                                      </p:cBhvr>
+                                    </p:animEffect>
+                                  </p:childTnLst>
+                                </p:cTn>
+                              </p:par>
+                            </p:childTnLst>
+                          </p:cTn>
+                        </p:par>
+                        <p:par>
+                          <p:cTn id="40" fill="hold">
+                            <p:stCondLst>
+                              <p:cond delay="9850"/>
+                            </p:stCondLst>
+                            <p:childTnLst>
+                              <p:par>
+                                <p:cTn id="41" presetID="26" presetClass="emph" presetSubtype="0" fill="hold" grpId="0" nodeType="afterEffect">
                                   <p:stCondLst>
                                     <p:cond delay="0"/>
                                   </p:stCondLst>
                                   <p:childTnLst>
                                     <p:animEffect transition="out" filter="fade">
                                       <p:cBhvr>
-                                        <p:cTn id="46" dur="500" tmFilter="0, 0; .2, .5; .8, .5; 1, 0"/>
+                                        <p:cTn id="42" dur="500" tmFilter="0, 0; .2, .5; .8, .5; 1, 0"/>
                                         <p:tgtEl>
                                           <p:spTgt spid="59"/>
                                         </p:tgtEl>
@@ -8577,7 +8443,7 @@
                                     </p:animEffect>
                                     <p:animScale>
                                       <p:cBhvr>
-                                        <p:cTn id="47" dur="250" autoRev="1" fill="hold"/>
+                                        <p:cTn id="43" dur="250" autoRev="1" fill="hold"/>
                                         <p:tgtEl>
                                           <p:spTgt spid="59"/>
                                         </p:tgtEl>
@@ -8590,30 +8456,21 @@
                             </p:childTnLst>
                           </p:cTn>
                         </p:par>
-                      </p:childTnLst>
-                    </p:cTn>
-                  </p:par>
-                  <p:par>
-                    <p:cTn id="48" fill="hold">
-                      <p:stCondLst>
-                        <p:cond delay="indefinite"/>
-                      </p:stCondLst>
-                      <p:childTnLst>
                         <p:par>
-                          <p:cTn id="49" fill="hold">
+                          <p:cTn id="44" fill="hold">
                             <p:stCondLst>
-                              <p:cond delay="0"/>
+                              <p:cond delay="10350"/>
                             </p:stCondLst>
                             <p:childTnLst>
                               <p:par>
-                                <p:cTn id="50" presetID="22" presetClass="entr" presetSubtype="4" fill="hold" nodeType="clickEffect">
+                                <p:cTn id="45" presetID="22" presetClass="entr" presetSubtype="4" fill="hold" nodeType="afterEffect">
                                   <p:stCondLst>
                                     <p:cond delay="0"/>
                                   </p:stCondLst>
                                   <p:childTnLst>
                                     <p:set>
                                       <p:cBhvr>
-                                        <p:cTn id="51" dur="1" fill="hold">
+                                        <p:cTn id="46" dur="1" fill="hold">
                                           <p:stCondLst>
                                             <p:cond delay="0"/>
                                           </p:stCondLst>
@@ -8631,7 +8488,7 @@
                                     </p:set>
                                     <p:animEffect transition="in" filter="wipe(down)">
                                       <p:cBhvr>
-                                        <p:cTn id="52" dur="500"/>
+                                        <p:cTn id="47" dur="500"/>
                                         <p:tgtEl>
                                           <p:spTgt spid="95"/>
                                         </p:tgtEl>
@@ -8643,30 +8500,21 @@
                             </p:childTnLst>
                           </p:cTn>
                         </p:par>
-                      </p:childTnLst>
-                    </p:cTn>
-                  </p:par>
-                  <p:par>
-                    <p:cTn id="53" fill="hold">
-                      <p:stCondLst>
-                        <p:cond delay="indefinite"/>
-                      </p:stCondLst>
-                      <p:childTnLst>
                         <p:par>
-                          <p:cTn id="54" fill="hold">
+                          <p:cTn id="48" fill="hold">
                             <p:stCondLst>
-                              <p:cond delay="0"/>
+                              <p:cond delay="10850"/>
                             </p:stCondLst>
                             <p:childTnLst>
                               <p:par>
-                                <p:cTn id="55" presetID="10" presetClass="exit" presetSubtype="0" fill="hold" nodeType="clickEffect">
+                                <p:cTn id="49" presetID="10" presetClass="exit" presetSubtype="0" fill="hold" nodeType="afterEffect">
                                   <p:stCondLst>
                                     <p:cond delay="0"/>
                                   </p:stCondLst>
                                   <p:childTnLst>
                                     <p:animEffect transition="out" filter="fade">
                                       <p:cBhvr>
-                                        <p:cTn id="56" dur="500"/>
+                                        <p:cTn id="50" dur="500"/>
                                         <p:tgtEl>
                                           <p:spTgt spid="63"/>
                                         </p:tgtEl>
@@ -8674,7 +8522,7 @@
                                     </p:animEffect>
                                     <p:set>
                                       <p:cBhvr>
-                                        <p:cTn id="57" dur="1" fill="hold">
+                                        <p:cTn id="51" dur="1" fill="hold">
                                           <p:stCondLst>
                                             <p:cond delay="499"/>
                                           </p:stCondLst>
@@ -8696,30 +8544,21 @@
                             </p:childTnLst>
                           </p:cTn>
                         </p:par>
-                      </p:childTnLst>
-                    </p:cTn>
-                  </p:par>
-                  <p:par>
-                    <p:cTn id="58" fill="hold">
-                      <p:stCondLst>
-                        <p:cond delay="indefinite"/>
-                      </p:stCondLst>
-                      <p:childTnLst>
                         <p:par>
-                          <p:cTn id="59" fill="hold">
+                          <p:cTn id="52" fill="hold">
                             <p:stCondLst>
-                              <p:cond delay="0"/>
+                              <p:cond delay="11350"/>
                             </p:stCondLst>
                             <p:childTnLst>
                               <p:par>
-                                <p:cTn id="60" presetID="10" presetClass="entr" presetSubtype="0" fill="hold" grpId="0" nodeType="clickEffect">
+                                <p:cTn id="53" presetID="10" presetClass="entr" presetSubtype="0" fill="hold" grpId="0" nodeType="afterEffect">
                                   <p:stCondLst>
                                     <p:cond delay="0"/>
                                   </p:stCondLst>
                                   <p:childTnLst>
                                     <p:set>
                                       <p:cBhvr>
-                                        <p:cTn id="61" dur="1" fill="hold">
+                                        <p:cTn id="54" dur="1" fill="hold">
                                           <p:stCondLst>
                                             <p:cond delay="0"/>
                                           </p:stCondLst>
@@ -8737,7 +8576,7 @@
                                     </p:set>
                                     <p:animEffect transition="in" filter="fade">
                                       <p:cBhvr>
-                                        <p:cTn id="62" dur="500"/>
+                                        <p:cTn id="55" dur="500"/>
                                         <p:tgtEl>
                                           <p:spTgt spid="80"/>
                                         </p:tgtEl>
@@ -8749,30 +8588,21 @@
                             </p:childTnLst>
                           </p:cTn>
                         </p:par>
-                      </p:childTnLst>
-                    </p:cTn>
-                  </p:par>
-                  <p:par>
-                    <p:cTn id="63" fill="hold">
-                      <p:stCondLst>
-                        <p:cond delay="indefinite"/>
-                      </p:stCondLst>
-                      <p:childTnLst>
                         <p:par>
-                          <p:cTn id="64" fill="hold">
+                          <p:cTn id="56" fill="hold">
                             <p:stCondLst>
-                              <p:cond delay="0"/>
+                              <p:cond delay="11850"/>
                             </p:stCondLst>
                             <p:childTnLst>
                               <p:par>
-                                <p:cTn id="65" presetID="22" presetClass="entr" presetSubtype="4" fill="hold" nodeType="clickEffect">
+                                <p:cTn id="57" presetID="22" presetClass="entr" presetSubtype="4" fill="hold" nodeType="afterEffect">
                                   <p:stCondLst>
                                     <p:cond delay="0"/>
                                   </p:stCondLst>
                                   <p:childTnLst>
                                     <p:set>
                                       <p:cBhvr>
-                                        <p:cTn id="66" dur="1" fill="hold">
+                                        <p:cTn id="58" dur="1" fill="hold">
                                           <p:stCondLst>
                                             <p:cond delay="0"/>
                                           </p:stCondLst>
@@ -8790,7 +8620,7 @@
                                     </p:set>
                                     <p:animEffect transition="in" filter="wipe(down)">
                                       <p:cBhvr>
-                                        <p:cTn id="67" dur="500"/>
+                                        <p:cTn id="59" dur="500"/>
                                         <p:tgtEl>
                                           <p:spTgt spid="65"/>
                                         </p:tgtEl>
@@ -8802,30 +8632,21 @@
                             </p:childTnLst>
                           </p:cTn>
                         </p:par>
-                      </p:childTnLst>
-                    </p:cTn>
-                  </p:par>
-                  <p:par>
-                    <p:cTn id="68" fill="hold">
-                      <p:stCondLst>
-                        <p:cond delay="indefinite"/>
-                      </p:stCondLst>
-                      <p:childTnLst>
                         <p:par>
-                          <p:cTn id="69" fill="hold">
+                          <p:cTn id="60" fill="hold">
                             <p:stCondLst>
-                              <p:cond delay="0"/>
+                              <p:cond delay="12350"/>
                             </p:stCondLst>
                             <p:childTnLst>
                               <p:par>
-                                <p:cTn id="70" presetID="26" presetClass="emph" presetSubtype="0" fill="hold" grpId="1" nodeType="clickEffect">
+                                <p:cTn id="61" presetID="26" presetClass="emph" presetSubtype="0" fill="hold" grpId="1" nodeType="afterEffect">
                                   <p:stCondLst>
                                     <p:cond delay="0"/>
                                   </p:stCondLst>
                                   <p:childTnLst>
                                     <p:animEffect transition="out" filter="fade">
                                       <p:cBhvr>
-                                        <p:cTn id="71" dur="500" tmFilter="0, 0; .2, .5; .8, .5; 1, 0"/>
+                                        <p:cTn id="62" dur="500" tmFilter="0, 0; .2, .5; .8, .5; 1, 0"/>
                                         <p:tgtEl>
                                           <p:spTgt spid="59"/>
                                         </p:tgtEl>
@@ -8833,7 +8654,7 @@
                                     </p:animEffect>
                                     <p:animScale>
                                       <p:cBhvr>
-                                        <p:cTn id="72" dur="250" autoRev="1" fill="hold"/>
+                                        <p:cTn id="63" dur="250" autoRev="1" fill="hold"/>
                                         <p:tgtEl>
                                           <p:spTgt spid="59"/>
                                         </p:tgtEl>
@@ -8846,30 +8667,21 @@
                             </p:childTnLst>
                           </p:cTn>
                         </p:par>
-                      </p:childTnLst>
-                    </p:cTn>
-                  </p:par>
-                  <p:par>
-                    <p:cTn id="73" fill="hold">
-                      <p:stCondLst>
-                        <p:cond delay="indefinite"/>
-                      </p:stCondLst>
-                      <p:childTnLst>
                         <p:par>
-                          <p:cTn id="74" fill="hold">
+                          <p:cTn id="64" fill="hold">
                             <p:stCondLst>
-                              <p:cond delay="0"/>
+                              <p:cond delay="12850"/>
                             </p:stCondLst>
                             <p:childTnLst>
                               <p:par>
-                                <p:cTn id="75" presetID="10" presetClass="exit" presetSubtype="0" fill="hold" nodeType="clickEffect">
+                                <p:cTn id="65" presetID="10" presetClass="exit" presetSubtype="0" fill="hold" nodeType="afterEffect">
                                   <p:stCondLst>
                                     <p:cond delay="0"/>
                                   </p:stCondLst>
                                   <p:childTnLst>
                                     <p:animEffect transition="out" filter="fade">
                                       <p:cBhvr>
-                                        <p:cTn id="76" dur="500"/>
+                                        <p:cTn id="66" dur="500"/>
                                         <p:tgtEl>
                                           <p:spTgt spid="65"/>
                                         </p:tgtEl>
@@ -8877,7 +8689,7 @@
                                     </p:animEffect>
                                     <p:set>
                                       <p:cBhvr>
-                                        <p:cTn id="77" dur="1" fill="hold">
+                                        <p:cTn id="67" dur="1" fill="hold">
                                           <p:stCondLst>
                                             <p:cond delay="499"/>
                                           </p:stCondLst>
@@ -8899,30 +8711,21 @@
                             </p:childTnLst>
                           </p:cTn>
                         </p:par>
-                      </p:childTnLst>
-                    </p:cTn>
-                  </p:par>
-                  <p:par>
-                    <p:cTn id="78" fill="hold">
-                      <p:stCondLst>
-                        <p:cond delay="indefinite"/>
-                      </p:stCondLst>
-                      <p:childTnLst>
                         <p:par>
-                          <p:cTn id="79" fill="hold">
+                          <p:cTn id="68" fill="hold">
                             <p:stCondLst>
-                              <p:cond delay="0"/>
+                              <p:cond delay="13350"/>
                             </p:stCondLst>
                             <p:childTnLst>
                               <p:par>
-                                <p:cTn id="80" presetID="10" presetClass="entr" presetSubtype="0" fill="hold" grpId="0" nodeType="clickEffect">
+                                <p:cTn id="69" presetID="10" presetClass="entr" presetSubtype="0" fill="hold" grpId="0" nodeType="afterEffect">
                                   <p:stCondLst>
                                     <p:cond delay="0"/>
                                   </p:stCondLst>
                                   <p:childTnLst>
                                     <p:set>
                                       <p:cBhvr>
-                                        <p:cTn id="81" dur="1" fill="hold">
+                                        <p:cTn id="70" dur="1" fill="hold">
                                           <p:stCondLst>
                                             <p:cond delay="0"/>
                                           </p:stCondLst>
@@ -8940,7 +8743,7 @@
                                     </p:set>
                                     <p:animEffect transition="in" filter="fade">
                                       <p:cBhvr>
-                                        <p:cTn id="82" dur="500"/>
+                                        <p:cTn id="71" dur="500"/>
                                         <p:tgtEl>
                                           <p:spTgt spid="81"/>
                                         </p:tgtEl>
@@ -8952,30 +8755,21 @@
                             </p:childTnLst>
                           </p:cTn>
                         </p:par>
-                      </p:childTnLst>
-                    </p:cTn>
-                  </p:par>
-                  <p:par>
-                    <p:cTn id="83" fill="hold">
-                      <p:stCondLst>
-                        <p:cond delay="indefinite"/>
-                      </p:stCondLst>
-                      <p:childTnLst>
                         <p:par>
-                          <p:cTn id="84" fill="hold">
+                          <p:cTn id="72" fill="hold">
                             <p:stCondLst>
-                              <p:cond delay="0"/>
+                              <p:cond delay="13850"/>
                             </p:stCondLst>
                             <p:childTnLst>
                               <p:par>
-                                <p:cTn id="85" presetID="22" presetClass="entr" presetSubtype="4" fill="hold" nodeType="clickEffect">
+                                <p:cTn id="73" presetID="22" presetClass="entr" presetSubtype="4" fill="hold" nodeType="afterEffect">
                                   <p:stCondLst>
                                     <p:cond delay="0"/>
                                   </p:stCondLst>
                                   <p:childTnLst>
                                     <p:set>
                                       <p:cBhvr>
-                                        <p:cTn id="86" dur="1" fill="hold">
+                                        <p:cTn id="74" dur="1" fill="hold">
                                           <p:stCondLst>
                                             <p:cond delay="0"/>
                                           </p:stCondLst>
@@ -8993,7 +8787,7 @@
                                     </p:set>
                                     <p:animEffect transition="in" filter="wipe(down)">
                                       <p:cBhvr>
-                                        <p:cTn id="87" dur="500"/>
+                                        <p:cTn id="75" dur="500"/>
                                         <p:tgtEl>
                                           <p:spTgt spid="66"/>
                                         </p:tgtEl>
@@ -9005,30 +8799,21 @@
                             </p:childTnLst>
                           </p:cTn>
                         </p:par>
-                      </p:childTnLst>
-                    </p:cTn>
-                  </p:par>
-                  <p:par>
-                    <p:cTn id="88" fill="hold">
-                      <p:stCondLst>
-                        <p:cond delay="indefinite"/>
-                      </p:stCondLst>
-                      <p:childTnLst>
                         <p:par>
-                          <p:cTn id="89" fill="hold">
+                          <p:cTn id="76" fill="hold">
                             <p:stCondLst>
-                              <p:cond delay="0"/>
+                              <p:cond delay="14350"/>
                             </p:stCondLst>
                             <p:childTnLst>
                               <p:par>
-                                <p:cTn id="90" presetID="26" presetClass="emph" presetSubtype="0" fill="hold" grpId="2" nodeType="clickEffect">
+                                <p:cTn id="77" presetID="26" presetClass="emph" presetSubtype="0" fill="hold" grpId="2" nodeType="afterEffect">
                                   <p:stCondLst>
                                     <p:cond delay="0"/>
                                   </p:stCondLst>
                                   <p:childTnLst>
                                     <p:animEffect transition="out" filter="fade">
                                       <p:cBhvr>
-                                        <p:cTn id="91" dur="500" tmFilter="0, 0; .2, .5; .8, .5; 1, 0"/>
+                                        <p:cTn id="78" dur="500" tmFilter="0, 0; .2, .5; .8, .5; 1, 0"/>
                                         <p:tgtEl>
                                           <p:spTgt spid="59"/>
                                         </p:tgtEl>
@@ -9036,7 +8821,7 @@
                                     </p:animEffect>
                                     <p:animScale>
                                       <p:cBhvr>
-                                        <p:cTn id="92" dur="250" autoRev="1" fill="hold"/>
+                                        <p:cTn id="79" dur="250" autoRev="1" fill="hold"/>
                                         <p:tgtEl>
                                           <p:spTgt spid="59"/>
                                         </p:tgtEl>
@@ -9049,30 +8834,21 @@
                             </p:childTnLst>
                           </p:cTn>
                         </p:par>
-                      </p:childTnLst>
-                    </p:cTn>
-                  </p:par>
-                  <p:par>
-                    <p:cTn id="93" fill="hold">
-                      <p:stCondLst>
-                        <p:cond delay="indefinite"/>
-                      </p:stCondLst>
-                      <p:childTnLst>
                         <p:par>
-                          <p:cTn id="94" fill="hold">
+                          <p:cTn id="80" fill="hold">
                             <p:stCondLst>
-                              <p:cond delay="0"/>
+                              <p:cond delay="14850"/>
                             </p:stCondLst>
                             <p:childTnLst>
                               <p:par>
-                                <p:cTn id="95" presetID="10" presetClass="exit" presetSubtype="0" fill="hold" nodeType="clickEffect">
+                                <p:cTn id="81" presetID="10" presetClass="exit" presetSubtype="0" fill="hold" nodeType="afterEffect">
                                   <p:stCondLst>
                                     <p:cond delay="0"/>
                                   </p:stCondLst>
                                   <p:childTnLst>
                                     <p:animEffect transition="out" filter="fade">
                                       <p:cBhvr>
-                                        <p:cTn id="96" dur="500"/>
+                                        <p:cTn id="82" dur="500"/>
                                         <p:tgtEl>
                                           <p:spTgt spid="66"/>
                                         </p:tgtEl>
@@ -9080,7 +8856,7 @@
                                     </p:animEffect>
                                     <p:set>
                                       <p:cBhvr>
-                                        <p:cTn id="97" dur="1" fill="hold">
+                                        <p:cTn id="83" dur="1" fill="hold">
                                           <p:stCondLst>
                                             <p:cond delay="499"/>
                                           </p:stCondLst>
@@ -9102,30 +8878,21 @@
                             </p:childTnLst>
                           </p:cTn>
                         </p:par>
-                      </p:childTnLst>
-                    </p:cTn>
-                  </p:par>
-                  <p:par>
-                    <p:cTn id="98" fill="hold">
-                      <p:stCondLst>
-                        <p:cond delay="indefinite"/>
-                      </p:stCondLst>
-                      <p:childTnLst>
                         <p:par>
-                          <p:cTn id="99" fill="hold">
+                          <p:cTn id="84" fill="hold">
                             <p:stCondLst>
-                              <p:cond delay="0"/>
+                              <p:cond delay="15350"/>
                             </p:stCondLst>
                             <p:childTnLst>
                               <p:par>
-                                <p:cTn id="100" presetID="10" presetClass="entr" presetSubtype="0" fill="hold" grpId="0" nodeType="clickEffect">
+                                <p:cTn id="85" presetID="10" presetClass="entr" presetSubtype="0" fill="hold" grpId="0" nodeType="afterEffect">
                                   <p:stCondLst>
                                     <p:cond delay="0"/>
                                   </p:stCondLst>
                                   <p:childTnLst>
                                     <p:set>
                                       <p:cBhvr>
-                                        <p:cTn id="101" dur="1" fill="hold">
+                                        <p:cTn id="86" dur="1" fill="hold">
                                           <p:stCondLst>
                                             <p:cond delay="0"/>
                                           </p:stCondLst>
@@ -9143,7 +8910,7 @@
                                     </p:set>
                                     <p:animEffect transition="in" filter="fade">
                                       <p:cBhvr>
-                                        <p:cTn id="102" dur="500"/>
+                                        <p:cTn id="87" dur="500"/>
                                         <p:tgtEl>
                                           <p:spTgt spid="82"/>
                                         </p:tgtEl>
@@ -9155,30 +8922,21 @@
                             </p:childTnLst>
                           </p:cTn>
                         </p:par>
-                      </p:childTnLst>
-                    </p:cTn>
-                  </p:par>
-                  <p:par>
-                    <p:cTn id="103" fill="hold">
-                      <p:stCondLst>
-                        <p:cond delay="indefinite"/>
-                      </p:stCondLst>
-                      <p:childTnLst>
                         <p:par>
-                          <p:cTn id="104" fill="hold">
+                          <p:cTn id="88" fill="hold">
                             <p:stCondLst>
-                              <p:cond delay="0"/>
+                              <p:cond delay="15850"/>
                             </p:stCondLst>
                             <p:childTnLst>
                               <p:par>
-                                <p:cTn id="105" presetID="22" presetClass="entr" presetSubtype="4" fill="hold" nodeType="clickEffect">
+                                <p:cTn id="89" presetID="22" presetClass="entr" presetSubtype="4" fill="hold" nodeType="afterEffect">
                                   <p:stCondLst>
                                     <p:cond delay="0"/>
                                   </p:stCondLst>
                                   <p:childTnLst>
                                     <p:set>
                                       <p:cBhvr>
-                                        <p:cTn id="106" dur="1" fill="hold">
+                                        <p:cTn id="90" dur="1" fill="hold">
                                           <p:stCondLst>
                                             <p:cond delay="0"/>
                                           </p:stCondLst>
@@ -9196,7 +8954,7 @@
                                     </p:set>
                                     <p:animEffect transition="in" filter="wipe(down)">
                                       <p:cBhvr>
-                                        <p:cTn id="107" dur="500"/>
+                                        <p:cTn id="91" dur="500"/>
                                         <p:tgtEl>
                                           <p:spTgt spid="150"/>
                                         </p:tgtEl>
@@ -9208,30 +8966,21 @@
                             </p:childTnLst>
                           </p:cTn>
                         </p:par>
-                      </p:childTnLst>
-                    </p:cTn>
-                  </p:par>
-                  <p:par>
-                    <p:cTn id="108" fill="hold">
-                      <p:stCondLst>
-                        <p:cond delay="indefinite"/>
-                      </p:stCondLst>
-                      <p:childTnLst>
                         <p:par>
-                          <p:cTn id="109" fill="hold">
+                          <p:cTn id="92" fill="hold">
                             <p:stCondLst>
-                              <p:cond delay="0"/>
+                              <p:cond delay="16350"/>
                             </p:stCondLst>
                             <p:childTnLst>
                               <p:par>
-                                <p:cTn id="110" presetID="26" presetClass="emph" presetSubtype="0" fill="hold" grpId="3" nodeType="clickEffect">
+                                <p:cTn id="93" presetID="26" presetClass="emph" presetSubtype="0" fill="hold" grpId="3" nodeType="afterEffect">
                                   <p:stCondLst>
                                     <p:cond delay="0"/>
                                   </p:stCondLst>
                                   <p:childTnLst>
                                     <p:animEffect transition="out" filter="fade">
                                       <p:cBhvr>
-                                        <p:cTn id="111" dur="500" tmFilter="0, 0; .2, .5; .8, .5; 1, 0"/>
+                                        <p:cTn id="94" dur="500" tmFilter="0, 0; .2, .5; .8, .5; 1, 0"/>
                                         <p:tgtEl>
                                           <p:spTgt spid="59"/>
                                         </p:tgtEl>
@@ -9239,7 +8988,7 @@
                                     </p:animEffect>
                                     <p:animScale>
                                       <p:cBhvr>
-                                        <p:cTn id="112" dur="250" autoRev="1" fill="hold"/>
+                                        <p:cTn id="95" dur="250" autoRev="1" fill="hold"/>
                                         <p:tgtEl>
                                           <p:spTgt spid="59"/>
                                         </p:tgtEl>
@@ -9252,30 +9001,21 @@
                             </p:childTnLst>
                           </p:cTn>
                         </p:par>
-                      </p:childTnLst>
-                    </p:cTn>
-                  </p:par>
-                  <p:par>
-                    <p:cTn id="113" fill="hold">
-                      <p:stCondLst>
-                        <p:cond delay="indefinite"/>
-                      </p:stCondLst>
-                      <p:childTnLst>
                         <p:par>
-                          <p:cTn id="114" fill="hold">
+                          <p:cTn id="96" fill="hold">
                             <p:stCondLst>
-                              <p:cond delay="0"/>
+                              <p:cond delay="16850"/>
                             </p:stCondLst>
                             <p:childTnLst>
                               <p:par>
-                                <p:cTn id="115" presetID="10" presetClass="exit" presetSubtype="0" fill="hold" nodeType="clickEffect">
+                                <p:cTn id="97" presetID="10" presetClass="exit" presetSubtype="0" fill="hold" nodeType="afterEffect">
                                   <p:stCondLst>
                                     <p:cond delay="0"/>
                                   </p:stCondLst>
                                   <p:childTnLst>
                                     <p:animEffect transition="out" filter="fade">
                                       <p:cBhvr>
-                                        <p:cTn id="116" dur="500"/>
+                                        <p:cTn id="98" dur="500"/>
                                         <p:tgtEl>
                                           <p:spTgt spid="150"/>
                                         </p:tgtEl>
@@ -9283,7 +9023,7 @@
                                     </p:animEffect>
                                     <p:set>
                                       <p:cBhvr>
-                                        <p:cTn id="117" dur="1" fill="hold">
+                                        <p:cTn id="99" dur="1" fill="hold">
                                           <p:stCondLst>
                                             <p:cond delay="499"/>
                                           </p:stCondLst>
@@ -9305,30 +9045,21 @@
                             </p:childTnLst>
                           </p:cTn>
                         </p:par>
-                      </p:childTnLst>
-                    </p:cTn>
-                  </p:par>
-                  <p:par>
-                    <p:cTn id="118" fill="hold">
-                      <p:stCondLst>
-                        <p:cond delay="indefinite"/>
-                      </p:stCondLst>
-                      <p:childTnLst>
                         <p:par>
-                          <p:cTn id="119" fill="hold">
+                          <p:cTn id="100" fill="hold">
                             <p:stCondLst>
-                              <p:cond delay="0"/>
+                              <p:cond delay="17350"/>
                             </p:stCondLst>
                             <p:childTnLst>
                               <p:par>
-                                <p:cTn id="120" presetID="10" presetClass="entr" presetSubtype="0" fill="hold" grpId="0" nodeType="clickEffect">
+                                <p:cTn id="101" presetID="10" presetClass="entr" presetSubtype="0" fill="hold" grpId="0" nodeType="afterEffect">
                                   <p:stCondLst>
                                     <p:cond delay="0"/>
                                   </p:stCondLst>
                                   <p:childTnLst>
                                     <p:set>
                                       <p:cBhvr>
-                                        <p:cTn id="121" dur="1" fill="hold">
+                                        <p:cTn id="102" dur="1" fill="hold">
                                           <p:stCondLst>
                                             <p:cond delay="0"/>
                                           </p:stCondLst>
@@ -9346,7 +9077,7 @@
                                     </p:set>
                                     <p:animEffect transition="in" filter="fade">
                                       <p:cBhvr>
-                                        <p:cTn id="122" dur="500"/>
+                                        <p:cTn id="103" dur="500"/>
                                         <p:tgtEl>
                                           <p:spTgt spid="83"/>
                                         </p:tgtEl>
@@ -9358,30 +9089,21 @@
                             </p:childTnLst>
                           </p:cTn>
                         </p:par>
-                      </p:childTnLst>
-                    </p:cTn>
-                  </p:par>
-                  <p:par>
-                    <p:cTn id="123" fill="hold">
-                      <p:stCondLst>
-                        <p:cond delay="indefinite"/>
-                      </p:stCondLst>
-                      <p:childTnLst>
                         <p:par>
-                          <p:cTn id="124" fill="hold">
+                          <p:cTn id="104" fill="hold">
                             <p:stCondLst>
-                              <p:cond delay="0"/>
+                              <p:cond delay="17850"/>
                             </p:stCondLst>
                             <p:childTnLst>
                               <p:par>
-                                <p:cTn id="125" presetID="22" presetClass="entr" presetSubtype="4" fill="hold" nodeType="clickEffect">
+                                <p:cTn id="105" presetID="22" presetClass="entr" presetSubtype="4" fill="hold" nodeType="afterEffect">
                                   <p:stCondLst>
                                     <p:cond delay="0"/>
                                   </p:stCondLst>
                                   <p:childTnLst>
                                     <p:set>
                                       <p:cBhvr>
-                                        <p:cTn id="126" dur="1" fill="hold">
+                                        <p:cTn id="106" dur="1" fill="hold">
                                           <p:stCondLst>
                                             <p:cond delay="0"/>
                                           </p:stCondLst>
@@ -9399,7 +9121,7 @@
                                     </p:set>
                                     <p:animEffect transition="in" filter="wipe(down)">
                                       <p:cBhvr>
-                                        <p:cTn id="127" dur="500"/>
+                                        <p:cTn id="107" dur="500"/>
                                         <p:tgtEl>
                                           <p:spTgt spid="152"/>
                                         </p:tgtEl>
@@ -9411,30 +9133,21 @@
                             </p:childTnLst>
                           </p:cTn>
                         </p:par>
-                      </p:childTnLst>
-                    </p:cTn>
-                  </p:par>
-                  <p:par>
-                    <p:cTn id="128" fill="hold">
-                      <p:stCondLst>
-                        <p:cond delay="indefinite"/>
-                      </p:stCondLst>
-                      <p:childTnLst>
                         <p:par>
-                          <p:cTn id="129" fill="hold">
+                          <p:cTn id="108" fill="hold">
                             <p:stCondLst>
-                              <p:cond delay="0"/>
+                              <p:cond delay="18350"/>
                             </p:stCondLst>
                             <p:childTnLst>
                               <p:par>
-                                <p:cTn id="130" presetID="26" presetClass="emph" presetSubtype="0" fill="hold" grpId="10" nodeType="clickEffect">
+                                <p:cTn id="109" presetID="26" presetClass="emph" presetSubtype="0" fill="hold" grpId="10" nodeType="afterEffect">
                                   <p:stCondLst>
                                     <p:cond delay="0"/>
                                   </p:stCondLst>
                                   <p:childTnLst>
                                     <p:animEffect transition="out" filter="fade">
                                       <p:cBhvr>
-                                        <p:cTn id="131" dur="500" tmFilter="0, 0; .2, .5; .8, .5; 1, 0"/>
+                                        <p:cTn id="110" dur="500" tmFilter="0, 0; .2, .5; .8, .5; 1, 0"/>
                                         <p:tgtEl>
                                           <p:spTgt spid="59"/>
                                         </p:tgtEl>
@@ -9442,7 +9155,7 @@
                                     </p:animEffect>
                                     <p:animScale>
                                       <p:cBhvr>
-                                        <p:cTn id="132" dur="250" autoRev="1" fill="hold"/>
+                                        <p:cTn id="111" dur="250" autoRev="1" fill="hold"/>
                                         <p:tgtEl>
                                           <p:spTgt spid="59"/>
                                         </p:tgtEl>
@@ -9455,30 +9168,21 @@
                             </p:childTnLst>
                           </p:cTn>
                         </p:par>
-                      </p:childTnLst>
-                    </p:cTn>
-                  </p:par>
-                  <p:par>
-                    <p:cTn id="133" fill="hold">
-                      <p:stCondLst>
-                        <p:cond delay="indefinite"/>
-                      </p:stCondLst>
-                      <p:childTnLst>
                         <p:par>
-                          <p:cTn id="134" fill="hold">
+                          <p:cTn id="112" fill="hold">
                             <p:stCondLst>
-                              <p:cond delay="0"/>
+                              <p:cond delay="18850"/>
                             </p:stCondLst>
                             <p:childTnLst>
                               <p:par>
-                                <p:cTn id="135" presetID="10" presetClass="exit" presetSubtype="0" fill="hold" nodeType="clickEffect">
+                                <p:cTn id="113" presetID="10" presetClass="exit" presetSubtype="0" fill="hold" nodeType="afterEffect">
                                   <p:stCondLst>
                                     <p:cond delay="0"/>
                                   </p:stCondLst>
                                   <p:childTnLst>
                                     <p:animEffect transition="out" filter="fade">
                                       <p:cBhvr>
-                                        <p:cTn id="136" dur="500"/>
+                                        <p:cTn id="114" dur="500"/>
                                         <p:tgtEl>
                                           <p:spTgt spid="152"/>
                                         </p:tgtEl>
@@ -9486,7 +9190,7 @@
                                     </p:animEffect>
                                     <p:set>
                                       <p:cBhvr>
-                                        <p:cTn id="137" dur="1" fill="hold">
+                                        <p:cTn id="115" dur="1" fill="hold">
                                           <p:stCondLst>
                                             <p:cond delay="499"/>
                                           </p:stCondLst>
@@ -9508,30 +9212,21 @@
                             </p:childTnLst>
                           </p:cTn>
                         </p:par>
-                      </p:childTnLst>
-                    </p:cTn>
-                  </p:par>
-                  <p:par>
-                    <p:cTn id="138" fill="hold">
-                      <p:stCondLst>
-                        <p:cond delay="indefinite"/>
-                      </p:stCondLst>
-                      <p:childTnLst>
                         <p:par>
-                          <p:cTn id="139" fill="hold">
+                          <p:cTn id="116" fill="hold">
                             <p:stCondLst>
-                              <p:cond delay="0"/>
+                              <p:cond delay="19350"/>
                             </p:stCondLst>
                             <p:childTnLst>
                               <p:par>
-                                <p:cTn id="140" presetID="10" presetClass="entr" presetSubtype="0" fill="hold" grpId="0" nodeType="clickEffect">
+                                <p:cTn id="117" presetID="10" presetClass="entr" presetSubtype="0" fill="hold" grpId="0" nodeType="afterEffect">
                                   <p:stCondLst>
                                     <p:cond delay="0"/>
                                   </p:stCondLst>
                                   <p:childTnLst>
                                     <p:set>
                                       <p:cBhvr>
-                                        <p:cTn id="141" dur="1" fill="hold">
+                                        <p:cTn id="118" dur="1" fill="hold">
                                           <p:stCondLst>
                                             <p:cond delay="0"/>
                                           </p:stCondLst>
@@ -9549,7 +9244,7 @@
                                     </p:set>
                                     <p:animEffect transition="in" filter="fade">
                                       <p:cBhvr>
-                                        <p:cTn id="142" dur="500"/>
+                                        <p:cTn id="119" dur="500"/>
                                         <p:tgtEl>
                                           <p:spTgt spid="84"/>
                                         </p:tgtEl>
@@ -9561,30 +9256,21 @@
                             </p:childTnLst>
                           </p:cTn>
                         </p:par>
-                      </p:childTnLst>
-                    </p:cTn>
-                  </p:par>
-                  <p:par>
-                    <p:cTn id="143" fill="hold">
-                      <p:stCondLst>
-                        <p:cond delay="indefinite"/>
-                      </p:stCondLst>
-                      <p:childTnLst>
                         <p:par>
-                          <p:cTn id="144" fill="hold">
+                          <p:cTn id="120" fill="hold">
                             <p:stCondLst>
-                              <p:cond delay="0"/>
+                              <p:cond delay="19850"/>
                             </p:stCondLst>
                             <p:childTnLst>
                               <p:par>
-                                <p:cTn id="145" presetID="22" presetClass="entr" presetSubtype="4" fill="hold" nodeType="clickEffect">
+                                <p:cTn id="121" presetID="22" presetClass="entr" presetSubtype="4" fill="hold" nodeType="afterEffect">
                                   <p:stCondLst>
                                     <p:cond delay="0"/>
                                   </p:stCondLst>
                                   <p:childTnLst>
                                     <p:set>
                                       <p:cBhvr>
-                                        <p:cTn id="146" dur="1" fill="hold">
+                                        <p:cTn id="122" dur="1" fill="hold">
                                           <p:stCondLst>
                                             <p:cond delay="0"/>
                                           </p:stCondLst>
@@ -9602,7 +9288,7 @@
                                     </p:set>
                                     <p:animEffect transition="in" filter="wipe(down)">
                                       <p:cBhvr>
-                                        <p:cTn id="147" dur="500"/>
+                                        <p:cTn id="123" dur="500"/>
                                         <p:tgtEl>
                                           <p:spTgt spid="153"/>
                                         </p:tgtEl>
@@ -9614,30 +9300,21 @@
                             </p:childTnLst>
                           </p:cTn>
                         </p:par>
-                      </p:childTnLst>
-                    </p:cTn>
-                  </p:par>
-                  <p:par>
-                    <p:cTn id="148" fill="hold">
-                      <p:stCondLst>
-                        <p:cond delay="indefinite"/>
-                      </p:stCondLst>
-                      <p:childTnLst>
                         <p:par>
-                          <p:cTn id="149" fill="hold">
+                          <p:cTn id="124" fill="hold">
                             <p:stCondLst>
-                              <p:cond delay="0"/>
+                              <p:cond delay="20350"/>
                             </p:stCondLst>
                             <p:childTnLst>
                               <p:par>
-                                <p:cTn id="150" presetID="26" presetClass="emph" presetSubtype="0" fill="hold" grpId="9" nodeType="clickEffect">
+                                <p:cTn id="125" presetID="26" presetClass="emph" presetSubtype="0" fill="hold" grpId="9" nodeType="afterEffect">
                                   <p:stCondLst>
                                     <p:cond delay="0"/>
                                   </p:stCondLst>
                                   <p:childTnLst>
                                     <p:animEffect transition="out" filter="fade">
                                       <p:cBhvr>
-                                        <p:cTn id="151" dur="500" tmFilter="0, 0; .2, .5; .8, .5; 1, 0"/>
+                                        <p:cTn id="126" dur="500" tmFilter="0, 0; .2, .5; .8, .5; 1, 0"/>
                                         <p:tgtEl>
                                           <p:spTgt spid="59"/>
                                         </p:tgtEl>
@@ -9645,7 +9322,7 @@
                                     </p:animEffect>
                                     <p:animScale>
                                       <p:cBhvr>
-                                        <p:cTn id="152" dur="250" autoRev="1" fill="hold"/>
+                                        <p:cTn id="127" dur="250" autoRev="1" fill="hold"/>
                                         <p:tgtEl>
                                           <p:spTgt spid="59"/>
                                         </p:tgtEl>
@@ -9658,30 +9335,21 @@
                             </p:childTnLst>
                           </p:cTn>
                         </p:par>
-                      </p:childTnLst>
-                    </p:cTn>
-                  </p:par>
-                  <p:par>
-                    <p:cTn id="153" fill="hold">
-                      <p:stCondLst>
-                        <p:cond delay="indefinite"/>
-                      </p:stCondLst>
-                      <p:childTnLst>
                         <p:par>
-                          <p:cTn id="154" fill="hold">
+                          <p:cTn id="128" fill="hold">
                             <p:stCondLst>
-                              <p:cond delay="0"/>
+                              <p:cond delay="20850"/>
                             </p:stCondLst>
                             <p:childTnLst>
                               <p:par>
-                                <p:cTn id="155" presetID="10" presetClass="exit" presetSubtype="0" fill="hold" nodeType="clickEffect">
+                                <p:cTn id="129" presetID="10" presetClass="exit" presetSubtype="0" fill="hold" nodeType="afterEffect">
                                   <p:stCondLst>
                                     <p:cond delay="0"/>
                                   </p:stCondLst>
                                   <p:childTnLst>
                                     <p:animEffect transition="out" filter="fade">
                                       <p:cBhvr>
-                                        <p:cTn id="156" dur="500"/>
+                                        <p:cTn id="130" dur="500"/>
                                         <p:tgtEl>
                                           <p:spTgt spid="153"/>
                                         </p:tgtEl>
@@ -9689,7 +9357,7 @@
                                     </p:animEffect>
                                     <p:set>
                                       <p:cBhvr>
-                                        <p:cTn id="157" dur="1" fill="hold">
+                                        <p:cTn id="131" dur="1" fill="hold">
                                           <p:stCondLst>
                                             <p:cond delay="499"/>
                                           </p:stCondLst>
@@ -9711,30 +9379,21 @@
                             </p:childTnLst>
                           </p:cTn>
                         </p:par>
-                      </p:childTnLst>
-                    </p:cTn>
-                  </p:par>
-                  <p:par>
-                    <p:cTn id="158" fill="hold">
-                      <p:stCondLst>
-                        <p:cond delay="indefinite"/>
-                      </p:stCondLst>
-                      <p:childTnLst>
                         <p:par>
-                          <p:cTn id="159" fill="hold">
+                          <p:cTn id="132" fill="hold">
                             <p:stCondLst>
-                              <p:cond delay="0"/>
+                              <p:cond delay="21350"/>
                             </p:stCondLst>
                             <p:childTnLst>
                               <p:par>
-                                <p:cTn id="160" presetID="10" presetClass="entr" presetSubtype="0" fill="hold" grpId="0" nodeType="clickEffect">
+                                <p:cTn id="133" presetID="10" presetClass="entr" presetSubtype="0" fill="hold" grpId="0" nodeType="afterEffect">
                                   <p:stCondLst>
                                     <p:cond delay="0"/>
                                   </p:stCondLst>
                                   <p:childTnLst>
                                     <p:set>
                                       <p:cBhvr>
-                                        <p:cTn id="161" dur="1" fill="hold">
+                                        <p:cTn id="134" dur="1" fill="hold">
                                           <p:stCondLst>
                                             <p:cond delay="0"/>
                                           </p:stCondLst>
@@ -9752,7 +9411,7 @@
                                     </p:set>
                                     <p:animEffect transition="in" filter="fade">
                                       <p:cBhvr>
-                                        <p:cTn id="162" dur="500"/>
+                                        <p:cTn id="135" dur="500"/>
                                         <p:tgtEl>
                                           <p:spTgt spid="85"/>
                                         </p:tgtEl>
@@ -9764,30 +9423,21 @@
                             </p:childTnLst>
                           </p:cTn>
                         </p:par>
-                      </p:childTnLst>
-                    </p:cTn>
-                  </p:par>
-                  <p:par>
-                    <p:cTn id="163" fill="hold">
-                      <p:stCondLst>
-                        <p:cond delay="indefinite"/>
-                      </p:stCondLst>
-                      <p:childTnLst>
                         <p:par>
-                          <p:cTn id="164" fill="hold">
+                          <p:cTn id="136" fill="hold">
                             <p:stCondLst>
-                              <p:cond delay="0"/>
+                              <p:cond delay="21850"/>
                             </p:stCondLst>
                             <p:childTnLst>
                               <p:par>
-                                <p:cTn id="165" presetID="22" presetClass="entr" presetSubtype="4" fill="hold" nodeType="clickEffect">
+                                <p:cTn id="137" presetID="22" presetClass="entr" presetSubtype="4" fill="hold" nodeType="afterEffect">
                                   <p:stCondLst>
                                     <p:cond delay="0"/>
                                   </p:stCondLst>
                                   <p:childTnLst>
                                     <p:set>
                                       <p:cBhvr>
-                                        <p:cTn id="166" dur="1" fill="hold">
+                                        <p:cTn id="138" dur="1" fill="hold">
                                           <p:stCondLst>
                                             <p:cond delay="0"/>
                                           </p:stCondLst>
@@ -9805,7 +9455,7 @@
                                     </p:set>
                                     <p:animEffect transition="in" filter="wipe(down)">
                                       <p:cBhvr>
-                                        <p:cTn id="167" dur="500"/>
+                                        <p:cTn id="139" dur="500"/>
                                         <p:tgtEl>
                                           <p:spTgt spid="154"/>
                                         </p:tgtEl>
@@ -9817,30 +9467,21 @@
                             </p:childTnLst>
                           </p:cTn>
                         </p:par>
-                      </p:childTnLst>
-                    </p:cTn>
-                  </p:par>
-                  <p:par>
-                    <p:cTn id="168" fill="hold">
-                      <p:stCondLst>
-                        <p:cond delay="indefinite"/>
-                      </p:stCondLst>
-                      <p:childTnLst>
                         <p:par>
-                          <p:cTn id="169" fill="hold">
+                          <p:cTn id="140" fill="hold">
                             <p:stCondLst>
-                              <p:cond delay="0"/>
+                              <p:cond delay="22350"/>
                             </p:stCondLst>
                             <p:childTnLst>
                               <p:par>
-                                <p:cTn id="170" presetID="26" presetClass="emph" presetSubtype="0" fill="hold" grpId="8" nodeType="clickEffect">
+                                <p:cTn id="141" presetID="26" presetClass="emph" presetSubtype="0" fill="hold" grpId="8" nodeType="afterEffect">
                                   <p:stCondLst>
                                     <p:cond delay="0"/>
                                   </p:stCondLst>
                                   <p:childTnLst>
                                     <p:animEffect transition="out" filter="fade">
                                       <p:cBhvr>
-                                        <p:cTn id="171" dur="500" tmFilter="0, 0; .2, .5; .8, .5; 1, 0"/>
+                                        <p:cTn id="142" dur="500" tmFilter="0, 0; .2, .5; .8, .5; 1, 0"/>
                                         <p:tgtEl>
                                           <p:spTgt spid="59"/>
                                         </p:tgtEl>
@@ -9848,7 +9489,7 @@
                                     </p:animEffect>
                                     <p:animScale>
                                       <p:cBhvr>
-                                        <p:cTn id="172" dur="250" autoRev="1" fill="hold"/>
+                                        <p:cTn id="143" dur="250" autoRev="1" fill="hold"/>
                                         <p:tgtEl>
                                           <p:spTgt spid="59"/>
                                         </p:tgtEl>
@@ -9861,30 +9502,21 @@
                             </p:childTnLst>
                           </p:cTn>
                         </p:par>
-                      </p:childTnLst>
-                    </p:cTn>
-                  </p:par>
-                  <p:par>
-                    <p:cTn id="173" fill="hold">
-                      <p:stCondLst>
-                        <p:cond delay="indefinite"/>
-                      </p:stCondLst>
-                      <p:childTnLst>
                         <p:par>
-                          <p:cTn id="174" fill="hold">
+                          <p:cTn id="144" fill="hold">
                             <p:stCondLst>
-                              <p:cond delay="0"/>
+                              <p:cond delay="22850"/>
                             </p:stCondLst>
                             <p:childTnLst>
                               <p:par>
-                                <p:cTn id="175" presetID="10" presetClass="exit" presetSubtype="0" fill="hold" nodeType="clickEffect">
+                                <p:cTn id="145" presetID="10" presetClass="exit" presetSubtype="0" fill="hold" nodeType="afterEffect">
                                   <p:stCondLst>
                                     <p:cond delay="0"/>
                                   </p:stCondLst>
                                   <p:childTnLst>
                                     <p:animEffect transition="out" filter="fade">
                                       <p:cBhvr>
-                                        <p:cTn id="176" dur="500"/>
+                                        <p:cTn id="146" dur="500"/>
                                         <p:tgtEl>
                                           <p:spTgt spid="154"/>
                                         </p:tgtEl>
@@ -9892,7 +9524,7 @@
                                     </p:animEffect>
                                     <p:set>
                                       <p:cBhvr>
-                                        <p:cTn id="177" dur="1" fill="hold">
+                                        <p:cTn id="147" dur="1" fill="hold">
                                           <p:stCondLst>
                                             <p:cond delay="499"/>
                                           </p:stCondLst>
@@ -9914,30 +9546,21 @@
                             </p:childTnLst>
                           </p:cTn>
                         </p:par>
-                      </p:childTnLst>
-                    </p:cTn>
-                  </p:par>
-                  <p:par>
-                    <p:cTn id="178" fill="hold">
-                      <p:stCondLst>
-                        <p:cond delay="indefinite"/>
-                      </p:stCondLst>
-                      <p:childTnLst>
                         <p:par>
-                          <p:cTn id="179" fill="hold">
+                          <p:cTn id="148" fill="hold">
                             <p:stCondLst>
-                              <p:cond delay="0"/>
+                              <p:cond delay="23350"/>
                             </p:stCondLst>
                             <p:childTnLst>
                               <p:par>
-                                <p:cTn id="180" presetID="10" presetClass="entr" presetSubtype="0" fill="hold" grpId="0" nodeType="clickEffect">
+                                <p:cTn id="149" presetID="10" presetClass="entr" presetSubtype="0" fill="hold" grpId="0" nodeType="afterEffect">
                                   <p:stCondLst>
                                     <p:cond delay="0"/>
                                   </p:stCondLst>
                                   <p:childTnLst>
                                     <p:set>
                                       <p:cBhvr>
-                                        <p:cTn id="181" dur="1" fill="hold">
+                                        <p:cTn id="150" dur="1" fill="hold">
                                           <p:stCondLst>
                                             <p:cond delay="0"/>
                                           </p:stCondLst>
@@ -9955,7 +9578,7 @@
                                     </p:set>
                                     <p:animEffect transition="in" filter="fade">
                                       <p:cBhvr>
-                                        <p:cTn id="182" dur="500"/>
+                                        <p:cTn id="151" dur="500"/>
                                         <p:tgtEl>
                                           <p:spTgt spid="86"/>
                                         </p:tgtEl>
@@ -9967,30 +9590,21 @@
                             </p:childTnLst>
                           </p:cTn>
                         </p:par>
-                      </p:childTnLst>
-                    </p:cTn>
-                  </p:par>
-                  <p:par>
-                    <p:cTn id="183" fill="hold">
-                      <p:stCondLst>
-                        <p:cond delay="indefinite"/>
-                      </p:stCondLst>
-                      <p:childTnLst>
                         <p:par>
-                          <p:cTn id="184" fill="hold">
+                          <p:cTn id="152" fill="hold">
                             <p:stCondLst>
-                              <p:cond delay="0"/>
+                              <p:cond delay="23850"/>
                             </p:stCondLst>
                             <p:childTnLst>
                               <p:par>
-                                <p:cTn id="185" presetID="22" presetClass="entr" presetSubtype="4" fill="hold" nodeType="clickEffect">
+                                <p:cTn id="153" presetID="22" presetClass="entr" presetSubtype="4" fill="hold" nodeType="afterEffect">
                                   <p:stCondLst>
                                     <p:cond delay="0"/>
                                   </p:stCondLst>
                                   <p:childTnLst>
                                     <p:set>
                                       <p:cBhvr>
-                                        <p:cTn id="186" dur="1" fill="hold">
+                                        <p:cTn id="154" dur="1" fill="hold">
                                           <p:stCondLst>
                                             <p:cond delay="0"/>
                                           </p:stCondLst>
@@ -10008,7 +9622,7 @@
                                     </p:set>
                                     <p:animEffect transition="in" filter="wipe(down)">
                                       <p:cBhvr>
-                                        <p:cTn id="187" dur="500"/>
+                                        <p:cTn id="155" dur="500"/>
                                         <p:tgtEl>
                                           <p:spTgt spid="156"/>
                                         </p:tgtEl>
@@ -10020,30 +9634,21 @@
                             </p:childTnLst>
                           </p:cTn>
                         </p:par>
-                      </p:childTnLst>
-                    </p:cTn>
-                  </p:par>
-                  <p:par>
-                    <p:cTn id="188" fill="hold">
-                      <p:stCondLst>
-                        <p:cond delay="indefinite"/>
-                      </p:stCondLst>
-                      <p:childTnLst>
                         <p:par>
-                          <p:cTn id="189" fill="hold">
+                          <p:cTn id="156" fill="hold">
                             <p:stCondLst>
-                              <p:cond delay="0"/>
+                              <p:cond delay="24350"/>
                             </p:stCondLst>
                             <p:childTnLst>
                               <p:par>
-                                <p:cTn id="190" presetID="26" presetClass="emph" presetSubtype="0" fill="hold" grpId="6" nodeType="clickEffect">
+                                <p:cTn id="157" presetID="26" presetClass="emph" presetSubtype="0" fill="hold" grpId="6" nodeType="afterEffect">
                                   <p:stCondLst>
                                     <p:cond delay="0"/>
                                   </p:stCondLst>
                                   <p:childTnLst>
                                     <p:animEffect transition="out" filter="fade">
                                       <p:cBhvr>
-                                        <p:cTn id="191" dur="500" tmFilter="0, 0; .2, .5; .8, .5; 1, 0"/>
+                                        <p:cTn id="158" dur="500" tmFilter="0, 0; .2, .5; .8, .5; 1, 0"/>
                                         <p:tgtEl>
                                           <p:spTgt spid="59"/>
                                         </p:tgtEl>
@@ -10051,7 +9656,7 @@
                                     </p:animEffect>
                                     <p:animScale>
                                       <p:cBhvr>
-                                        <p:cTn id="192" dur="250" autoRev="1" fill="hold"/>
+                                        <p:cTn id="159" dur="250" autoRev="1" fill="hold"/>
                                         <p:tgtEl>
                                           <p:spTgt spid="59"/>
                                         </p:tgtEl>
@@ -10064,30 +9669,21 @@
                             </p:childTnLst>
                           </p:cTn>
                         </p:par>
-                      </p:childTnLst>
-                    </p:cTn>
-                  </p:par>
-                  <p:par>
-                    <p:cTn id="193" fill="hold">
-                      <p:stCondLst>
-                        <p:cond delay="indefinite"/>
-                      </p:stCondLst>
-                      <p:childTnLst>
                         <p:par>
-                          <p:cTn id="194" fill="hold">
+                          <p:cTn id="160" fill="hold">
                             <p:stCondLst>
-                              <p:cond delay="0"/>
+                              <p:cond delay="24850"/>
                             </p:stCondLst>
                             <p:childTnLst>
                               <p:par>
-                                <p:cTn id="195" presetID="10" presetClass="exit" presetSubtype="0" fill="hold" nodeType="clickEffect">
+                                <p:cTn id="161" presetID="10" presetClass="exit" presetSubtype="0" fill="hold" nodeType="afterEffect">
                                   <p:stCondLst>
                                     <p:cond delay="0"/>
                                   </p:stCondLst>
                                   <p:childTnLst>
                                     <p:animEffect transition="out" filter="fade">
                                       <p:cBhvr>
-                                        <p:cTn id="196" dur="500"/>
+                                        <p:cTn id="162" dur="500"/>
                                         <p:tgtEl>
                                           <p:spTgt spid="156"/>
                                         </p:tgtEl>
@@ -10095,7 +9691,7 @@
                                     </p:animEffect>
                                     <p:set>
                                       <p:cBhvr>
-                                        <p:cTn id="197" dur="1" fill="hold">
+                                        <p:cTn id="163" dur="1" fill="hold">
                                           <p:stCondLst>
                                             <p:cond delay="499"/>
                                           </p:stCondLst>
@@ -10117,30 +9713,21 @@
                             </p:childTnLst>
                           </p:cTn>
                         </p:par>
-                      </p:childTnLst>
-                    </p:cTn>
-                  </p:par>
-                  <p:par>
-                    <p:cTn id="198" fill="hold">
-                      <p:stCondLst>
-                        <p:cond delay="indefinite"/>
-                      </p:stCondLst>
-                      <p:childTnLst>
                         <p:par>
-                          <p:cTn id="199" fill="hold">
+                          <p:cTn id="164" fill="hold">
                             <p:stCondLst>
-                              <p:cond delay="0"/>
+                              <p:cond delay="25350"/>
                             </p:stCondLst>
                             <p:childTnLst>
                               <p:par>
-                                <p:cTn id="200" presetID="10" presetClass="entr" presetSubtype="0" fill="hold" grpId="0" nodeType="clickEffect">
+                                <p:cTn id="165" presetID="10" presetClass="entr" presetSubtype="0" fill="hold" grpId="0" nodeType="afterEffect">
                                   <p:stCondLst>
                                     <p:cond delay="0"/>
                                   </p:stCondLst>
                                   <p:childTnLst>
                                     <p:set>
                                       <p:cBhvr>
-                                        <p:cTn id="201" dur="1" fill="hold">
+                                        <p:cTn id="166" dur="1" fill="hold">
                                           <p:stCondLst>
                                             <p:cond delay="0"/>
                                           </p:stCondLst>
@@ -10158,7 +9745,7 @@
                                     </p:set>
                                     <p:animEffect transition="in" filter="fade">
                                       <p:cBhvr>
-                                        <p:cTn id="202" dur="500"/>
+                                        <p:cTn id="167" dur="500"/>
                                         <p:tgtEl>
                                           <p:spTgt spid="87"/>
                                         </p:tgtEl>
@@ -10170,30 +9757,21 @@
                             </p:childTnLst>
                           </p:cTn>
                         </p:par>
-                      </p:childTnLst>
-                    </p:cTn>
-                  </p:par>
-                  <p:par>
-                    <p:cTn id="203" fill="hold">
-                      <p:stCondLst>
-                        <p:cond delay="indefinite"/>
-                      </p:stCondLst>
-                      <p:childTnLst>
                         <p:par>
-                          <p:cTn id="204" fill="hold">
+                          <p:cTn id="168" fill="hold">
                             <p:stCondLst>
-                              <p:cond delay="0"/>
+                              <p:cond delay="25850"/>
                             </p:stCondLst>
                             <p:childTnLst>
                               <p:par>
-                                <p:cTn id="205" presetID="22" presetClass="entr" presetSubtype="4" fill="hold" nodeType="clickEffect">
+                                <p:cTn id="169" presetID="22" presetClass="entr" presetSubtype="4" fill="hold" nodeType="afterEffect">
                                   <p:stCondLst>
                                     <p:cond delay="0"/>
                                   </p:stCondLst>
                                   <p:childTnLst>
                                     <p:set>
                                       <p:cBhvr>
-                                        <p:cTn id="206" dur="1" fill="hold">
+                                        <p:cTn id="170" dur="1" fill="hold">
                                           <p:stCondLst>
                                             <p:cond delay="0"/>
                                           </p:stCondLst>
@@ -10211,7 +9789,7 @@
                                     </p:set>
                                     <p:animEffect transition="in" filter="wipe(down)">
                                       <p:cBhvr>
-                                        <p:cTn id="207" dur="500"/>
+                                        <p:cTn id="171" dur="500"/>
                                         <p:tgtEl>
                                           <p:spTgt spid="157"/>
                                         </p:tgtEl>
@@ -10223,30 +9801,21 @@
                             </p:childTnLst>
                           </p:cTn>
                         </p:par>
-                      </p:childTnLst>
-                    </p:cTn>
-                  </p:par>
-                  <p:par>
-                    <p:cTn id="208" fill="hold">
-                      <p:stCondLst>
-                        <p:cond delay="indefinite"/>
-                      </p:stCondLst>
-                      <p:childTnLst>
                         <p:par>
-                          <p:cTn id="209" fill="hold">
+                          <p:cTn id="172" fill="hold">
                             <p:stCondLst>
-                              <p:cond delay="0"/>
+                              <p:cond delay="26350"/>
                             </p:stCondLst>
                             <p:childTnLst>
                               <p:par>
-                                <p:cTn id="210" presetID="26" presetClass="emph" presetSubtype="0" fill="hold" grpId="5" nodeType="clickEffect">
+                                <p:cTn id="173" presetID="26" presetClass="emph" presetSubtype="0" fill="hold" grpId="5" nodeType="afterEffect">
                                   <p:stCondLst>
                                     <p:cond delay="0"/>
                                   </p:stCondLst>
                                   <p:childTnLst>
                                     <p:animEffect transition="out" filter="fade">
                                       <p:cBhvr>
-                                        <p:cTn id="211" dur="500" tmFilter="0, 0; .2, .5; .8, .5; 1, 0"/>
+                                        <p:cTn id="174" dur="500" tmFilter="0, 0; .2, .5; .8, .5; 1, 0"/>
                                         <p:tgtEl>
                                           <p:spTgt spid="59"/>
                                         </p:tgtEl>
@@ -10254,7 +9823,7 @@
                                     </p:animEffect>
                                     <p:animScale>
                                       <p:cBhvr>
-                                        <p:cTn id="212" dur="250" autoRev="1" fill="hold"/>
+                                        <p:cTn id="175" dur="250" autoRev="1" fill="hold"/>
                                         <p:tgtEl>
                                           <p:spTgt spid="59"/>
                                         </p:tgtEl>
@@ -10267,30 +9836,21 @@
                             </p:childTnLst>
                           </p:cTn>
                         </p:par>
-                      </p:childTnLst>
-                    </p:cTn>
-                  </p:par>
-                  <p:par>
-                    <p:cTn id="213" fill="hold">
-                      <p:stCondLst>
-                        <p:cond delay="indefinite"/>
-                      </p:stCondLst>
-                      <p:childTnLst>
                         <p:par>
-                          <p:cTn id="214" fill="hold">
+                          <p:cTn id="176" fill="hold">
                             <p:stCondLst>
-                              <p:cond delay="0"/>
+                              <p:cond delay="26850"/>
                             </p:stCondLst>
                             <p:childTnLst>
                               <p:par>
-                                <p:cTn id="215" presetID="10" presetClass="exit" presetSubtype="0" fill="hold" nodeType="clickEffect">
+                                <p:cTn id="177" presetID="10" presetClass="exit" presetSubtype="0" fill="hold" nodeType="afterEffect">
                                   <p:stCondLst>
                                     <p:cond delay="0"/>
                                   </p:stCondLst>
                                   <p:childTnLst>
                                     <p:animEffect transition="out" filter="fade">
                                       <p:cBhvr>
-                                        <p:cTn id="216" dur="500"/>
+                                        <p:cTn id="178" dur="500"/>
                                         <p:tgtEl>
                                           <p:spTgt spid="157"/>
                                         </p:tgtEl>
@@ -10298,7 +9858,7 @@
                                     </p:animEffect>
                                     <p:set>
                                       <p:cBhvr>
-                                        <p:cTn id="217" dur="1" fill="hold">
+                                        <p:cTn id="179" dur="1" fill="hold">
                                           <p:stCondLst>
                                             <p:cond delay="499"/>
                                           </p:stCondLst>
@@ -10320,30 +9880,21 @@
                             </p:childTnLst>
                           </p:cTn>
                         </p:par>
-                      </p:childTnLst>
-                    </p:cTn>
-                  </p:par>
-                  <p:par>
-                    <p:cTn id="218" fill="hold">
-                      <p:stCondLst>
-                        <p:cond delay="indefinite"/>
-                      </p:stCondLst>
-                      <p:childTnLst>
                         <p:par>
-                          <p:cTn id="219" fill="hold">
+                          <p:cTn id="180" fill="hold">
                             <p:stCondLst>
-                              <p:cond delay="0"/>
+                              <p:cond delay="27350"/>
                             </p:stCondLst>
                             <p:childTnLst>
                               <p:par>
-                                <p:cTn id="220" presetID="10" presetClass="entr" presetSubtype="0" fill="hold" grpId="0" nodeType="clickEffect">
+                                <p:cTn id="181" presetID="10" presetClass="entr" presetSubtype="0" fill="hold" grpId="0" nodeType="afterEffect">
                                   <p:stCondLst>
                                     <p:cond delay="0"/>
                                   </p:stCondLst>
                                   <p:childTnLst>
                                     <p:set>
                                       <p:cBhvr>
-                                        <p:cTn id="221" dur="1" fill="hold">
+                                        <p:cTn id="182" dur="1" fill="hold">
                                           <p:stCondLst>
                                             <p:cond delay="0"/>
                                           </p:stCondLst>
@@ -10361,7 +9912,7 @@
                                     </p:set>
                                     <p:animEffect transition="in" filter="fade">
                                       <p:cBhvr>
-                                        <p:cTn id="222" dur="500"/>
+                                        <p:cTn id="183" dur="500"/>
                                         <p:tgtEl>
                                           <p:spTgt spid="88"/>
                                         </p:tgtEl>
@@ -10373,30 +9924,21 @@
                             </p:childTnLst>
                           </p:cTn>
                         </p:par>
-                      </p:childTnLst>
-                    </p:cTn>
-                  </p:par>
-                  <p:par>
-                    <p:cTn id="223" fill="hold">
-                      <p:stCondLst>
-                        <p:cond delay="indefinite"/>
-                      </p:stCondLst>
-                      <p:childTnLst>
                         <p:par>
-                          <p:cTn id="224" fill="hold">
+                          <p:cTn id="184" fill="hold">
                             <p:stCondLst>
-                              <p:cond delay="0"/>
+                              <p:cond delay="27850"/>
                             </p:stCondLst>
                             <p:childTnLst>
                               <p:par>
-                                <p:cTn id="225" presetID="22" presetClass="entr" presetSubtype="4" fill="hold" nodeType="clickEffect">
+                                <p:cTn id="185" presetID="22" presetClass="entr" presetSubtype="4" fill="hold" nodeType="afterEffect">
                                   <p:stCondLst>
                                     <p:cond delay="0"/>
                                   </p:stCondLst>
                                   <p:childTnLst>
                                     <p:set>
                                       <p:cBhvr>
-                                        <p:cTn id="226" dur="1" fill="hold">
+                                        <p:cTn id="186" dur="1" fill="hold">
                                           <p:stCondLst>
                                             <p:cond delay="0"/>
                                           </p:stCondLst>
@@ -10414,7 +9956,7 @@
                                     </p:set>
                                     <p:animEffect transition="in" filter="wipe(down)">
                                       <p:cBhvr>
-                                        <p:cTn id="227" dur="500"/>
+                                        <p:cTn id="187" dur="500"/>
                                         <p:tgtEl>
                                           <p:spTgt spid="158"/>
                                         </p:tgtEl>
@@ -10426,30 +9968,21 @@
                             </p:childTnLst>
                           </p:cTn>
                         </p:par>
-                      </p:childTnLst>
-                    </p:cTn>
-                  </p:par>
-                  <p:par>
-                    <p:cTn id="228" fill="hold">
-                      <p:stCondLst>
-                        <p:cond delay="indefinite"/>
-                      </p:stCondLst>
-                      <p:childTnLst>
                         <p:par>
-                          <p:cTn id="229" fill="hold">
+                          <p:cTn id="188" fill="hold">
                             <p:stCondLst>
-                              <p:cond delay="0"/>
+                              <p:cond delay="28350"/>
                             </p:stCondLst>
                             <p:childTnLst>
                               <p:par>
-                                <p:cTn id="230" presetID="26" presetClass="emph" presetSubtype="0" fill="hold" grpId="4" nodeType="clickEffect">
+                                <p:cTn id="189" presetID="26" presetClass="emph" presetSubtype="0" fill="hold" grpId="4" nodeType="afterEffect">
                                   <p:stCondLst>
                                     <p:cond delay="0"/>
                                   </p:stCondLst>
                                   <p:childTnLst>
                                     <p:animEffect transition="out" filter="fade">
                                       <p:cBhvr>
-                                        <p:cTn id="231" dur="500" tmFilter="0, 0; .2, .5; .8, .5; 1, 0"/>
+                                        <p:cTn id="190" dur="500" tmFilter="0, 0; .2, .5; .8, .5; 1, 0"/>
                                         <p:tgtEl>
                                           <p:spTgt spid="59"/>
                                         </p:tgtEl>
@@ -10457,7 +9990,7 @@
                                     </p:animEffect>
                                     <p:animScale>
                                       <p:cBhvr>
-                                        <p:cTn id="232" dur="250" autoRev="1" fill="hold"/>
+                                        <p:cTn id="191" dur="250" autoRev="1" fill="hold"/>
                                         <p:tgtEl>
                                           <p:spTgt spid="59"/>
                                         </p:tgtEl>
@@ -10470,30 +10003,21 @@
                             </p:childTnLst>
                           </p:cTn>
                         </p:par>
-                      </p:childTnLst>
-                    </p:cTn>
-                  </p:par>
-                  <p:par>
-                    <p:cTn id="233" fill="hold">
-                      <p:stCondLst>
-                        <p:cond delay="indefinite"/>
-                      </p:stCondLst>
-                      <p:childTnLst>
                         <p:par>
-                          <p:cTn id="234" fill="hold">
+                          <p:cTn id="192" fill="hold">
                             <p:stCondLst>
-                              <p:cond delay="0"/>
+                              <p:cond delay="28850"/>
                             </p:stCondLst>
                             <p:childTnLst>
                               <p:par>
-                                <p:cTn id="235" presetID="10" presetClass="exit" presetSubtype="0" fill="hold" nodeType="clickEffect">
+                                <p:cTn id="193" presetID="10" presetClass="exit" presetSubtype="0" fill="hold" nodeType="afterEffect">
                                   <p:stCondLst>
                                     <p:cond delay="0"/>
                                   </p:stCondLst>
                                   <p:childTnLst>
                                     <p:animEffect transition="out" filter="fade">
                                       <p:cBhvr>
-                                        <p:cTn id="236" dur="500"/>
+                                        <p:cTn id="194" dur="500"/>
                                         <p:tgtEl>
                                           <p:spTgt spid="158"/>
                                         </p:tgtEl>
@@ -10501,7 +10025,7 @@
                                     </p:animEffect>
                                     <p:set>
                                       <p:cBhvr>
-                                        <p:cTn id="237" dur="1" fill="hold">
+                                        <p:cTn id="195" dur="1" fill="hold">
                                           <p:stCondLst>
                                             <p:cond delay="499"/>
                                           </p:stCondLst>
@@ -10523,30 +10047,21 @@
                             </p:childTnLst>
                           </p:cTn>
                         </p:par>
-                      </p:childTnLst>
-                    </p:cTn>
-                  </p:par>
-                  <p:par>
-                    <p:cTn id="238" fill="hold">
-                      <p:stCondLst>
-                        <p:cond delay="indefinite"/>
-                      </p:stCondLst>
-                      <p:childTnLst>
                         <p:par>
-                          <p:cTn id="239" fill="hold">
+                          <p:cTn id="196" fill="hold">
                             <p:stCondLst>
-                              <p:cond delay="0"/>
+                              <p:cond delay="29350"/>
                             </p:stCondLst>
                             <p:childTnLst>
                               <p:par>
-                                <p:cTn id="240" presetID="10" presetClass="entr" presetSubtype="0" fill="hold" grpId="0" nodeType="clickEffect">
+                                <p:cTn id="197" presetID="10" presetClass="entr" presetSubtype="0" fill="hold" grpId="0" nodeType="afterEffect">
                                   <p:stCondLst>
                                     <p:cond delay="0"/>
                                   </p:stCondLst>
                                   <p:childTnLst>
                                     <p:set>
                                       <p:cBhvr>
-                                        <p:cTn id="241" dur="1" fill="hold">
+                                        <p:cTn id="198" dur="1" fill="hold">
                                           <p:stCondLst>
                                             <p:cond delay="0"/>
                                           </p:stCondLst>
@@ -10564,7 +10079,7 @@
                                     </p:set>
                                     <p:animEffect transition="in" filter="fade">
                                       <p:cBhvr>
-                                        <p:cTn id="242" dur="500"/>
+                                        <p:cTn id="199" dur="500"/>
                                         <p:tgtEl>
                                           <p:spTgt spid="114"/>
                                         </p:tgtEl>
@@ -10576,30 +10091,21 @@
                             </p:childTnLst>
                           </p:cTn>
                         </p:par>
-                      </p:childTnLst>
-                    </p:cTn>
-                  </p:par>
-                  <p:par>
-                    <p:cTn id="243" fill="hold">
-                      <p:stCondLst>
-                        <p:cond delay="indefinite"/>
-                      </p:stCondLst>
-                      <p:childTnLst>
                         <p:par>
-                          <p:cTn id="244" fill="hold">
+                          <p:cTn id="200" fill="hold">
                             <p:stCondLst>
-                              <p:cond delay="0"/>
+                              <p:cond delay="29850"/>
                             </p:stCondLst>
                             <p:childTnLst>
                               <p:par>
-                                <p:cTn id="245" presetID="22" presetClass="entr" presetSubtype="4" fill="hold" nodeType="clickEffect">
+                                <p:cTn id="201" presetID="22" presetClass="entr" presetSubtype="4" fill="hold" nodeType="afterEffect">
                                   <p:stCondLst>
                                     <p:cond delay="0"/>
                                   </p:stCondLst>
                                   <p:childTnLst>
                                     <p:set>
                                       <p:cBhvr>
-                                        <p:cTn id="246" dur="1" fill="hold">
+                                        <p:cTn id="202" dur="1" fill="hold">
                                           <p:stCondLst>
                                             <p:cond delay="0"/>
                                           </p:stCondLst>
@@ -10617,7 +10123,7 @@
                                     </p:set>
                                     <p:animEffect transition="in" filter="wipe(down)">
                                       <p:cBhvr>
-                                        <p:cTn id="247" dur="500"/>
+                                        <p:cTn id="203" dur="500"/>
                                         <p:tgtEl>
                                           <p:spTgt spid="160"/>
                                         </p:tgtEl>
@@ -10629,30 +10135,21 @@
                             </p:childTnLst>
                           </p:cTn>
                         </p:par>
-                      </p:childTnLst>
-                    </p:cTn>
-                  </p:par>
-                  <p:par>
-                    <p:cTn id="248" fill="hold">
-                      <p:stCondLst>
-                        <p:cond delay="indefinite"/>
-                      </p:stCondLst>
-                      <p:childTnLst>
                         <p:par>
-                          <p:cTn id="249" fill="hold">
+                          <p:cTn id="204" fill="hold">
                             <p:stCondLst>
-                              <p:cond delay="0"/>
+                              <p:cond delay="30350"/>
                             </p:stCondLst>
                             <p:childTnLst>
                               <p:par>
-                                <p:cTn id="250" presetID="26" presetClass="emph" presetSubtype="0" fill="hold" grpId="11" nodeType="clickEffect">
+                                <p:cTn id="205" presetID="26" presetClass="emph" presetSubtype="0" fill="hold" grpId="11" nodeType="afterEffect">
                                   <p:stCondLst>
                                     <p:cond delay="0"/>
                                   </p:stCondLst>
                                   <p:childTnLst>
                                     <p:animEffect transition="out" filter="fade">
                                       <p:cBhvr>
-                                        <p:cTn id="251" dur="500" tmFilter="0, 0; .2, .5; .8, .5; 1, 0"/>
+                                        <p:cTn id="206" dur="500" tmFilter="0, 0; .2, .5; .8, .5; 1, 0"/>
                                         <p:tgtEl>
                                           <p:spTgt spid="59"/>
                                         </p:tgtEl>
@@ -10660,7 +10157,7 @@
                                     </p:animEffect>
                                     <p:animScale>
                                       <p:cBhvr>
-                                        <p:cTn id="252" dur="250" autoRev="1" fill="hold"/>
+                                        <p:cTn id="207" dur="250" autoRev="1" fill="hold"/>
                                         <p:tgtEl>
                                           <p:spTgt spid="59"/>
                                         </p:tgtEl>
@@ -10673,30 +10170,21 @@
                             </p:childTnLst>
                           </p:cTn>
                         </p:par>
-                      </p:childTnLst>
-                    </p:cTn>
-                  </p:par>
-                  <p:par>
-                    <p:cTn id="253" fill="hold">
-                      <p:stCondLst>
-                        <p:cond delay="indefinite"/>
-                      </p:stCondLst>
-                      <p:childTnLst>
                         <p:par>
-                          <p:cTn id="254" fill="hold">
+                          <p:cTn id="208" fill="hold">
                             <p:stCondLst>
-                              <p:cond delay="0"/>
+                              <p:cond delay="30850"/>
                             </p:stCondLst>
                             <p:childTnLst>
                               <p:par>
-                                <p:cTn id="255" presetID="10" presetClass="exit" presetSubtype="0" fill="hold" nodeType="clickEffect">
+                                <p:cTn id="209" presetID="10" presetClass="exit" presetSubtype="0" fill="hold" nodeType="afterEffect">
                                   <p:stCondLst>
                                     <p:cond delay="0"/>
                                   </p:stCondLst>
                                   <p:childTnLst>
                                     <p:animEffect transition="out" filter="fade">
                                       <p:cBhvr>
-                                        <p:cTn id="256" dur="500"/>
+                                        <p:cTn id="210" dur="500"/>
                                         <p:tgtEl>
                                           <p:spTgt spid="160"/>
                                         </p:tgtEl>
@@ -10704,7 +10192,7 @@
                                     </p:animEffect>
                                     <p:set>
                                       <p:cBhvr>
-                                        <p:cTn id="257" dur="1" fill="hold">
+                                        <p:cTn id="211" dur="1" fill="hold">
                                           <p:stCondLst>
                                             <p:cond delay="499"/>
                                           </p:stCondLst>
@@ -10726,30 +10214,21 @@
                             </p:childTnLst>
                           </p:cTn>
                         </p:par>
-                      </p:childTnLst>
-                    </p:cTn>
-                  </p:par>
-                  <p:par>
-                    <p:cTn id="258" fill="hold">
-                      <p:stCondLst>
-                        <p:cond delay="indefinite"/>
-                      </p:stCondLst>
-                      <p:childTnLst>
                         <p:par>
-                          <p:cTn id="259" fill="hold">
+                          <p:cTn id="212" fill="hold">
                             <p:stCondLst>
-                              <p:cond delay="0"/>
+                              <p:cond delay="31350"/>
                             </p:stCondLst>
                             <p:childTnLst>
                               <p:par>
-                                <p:cTn id="260" presetID="10" presetClass="entr" presetSubtype="0" fill="hold" grpId="0" nodeType="clickEffect">
+                                <p:cTn id="213" presetID="10" presetClass="entr" presetSubtype="0" fill="hold" grpId="0" nodeType="afterEffect">
                                   <p:stCondLst>
                                     <p:cond delay="0"/>
                                   </p:stCondLst>
                                   <p:childTnLst>
                                     <p:set>
                                       <p:cBhvr>
-                                        <p:cTn id="261" dur="1" fill="hold">
+                                        <p:cTn id="214" dur="1" fill="hold">
                                           <p:stCondLst>
                                             <p:cond delay="0"/>
                                           </p:stCondLst>
@@ -10767,7 +10246,7 @@
                                     </p:set>
                                     <p:animEffect transition="in" filter="fade">
                                       <p:cBhvr>
-                                        <p:cTn id="262" dur="500"/>
+                                        <p:cTn id="215" dur="500"/>
                                         <p:tgtEl>
                                           <p:spTgt spid="115"/>
                                         </p:tgtEl>
@@ -10779,30 +10258,21 @@
                             </p:childTnLst>
                           </p:cTn>
                         </p:par>
-                      </p:childTnLst>
-                    </p:cTn>
-                  </p:par>
-                  <p:par>
-                    <p:cTn id="263" fill="hold">
-                      <p:stCondLst>
-                        <p:cond delay="indefinite"/>
-                      </p:stCondLst>
-                      <p:childTnLst>
                         <p:par>
-                          <p:cTn id="264" fill="hold">
+                          <p:cTn id="216" fill="hold">
                             <p:stCondLst>
-                              <p:cond delay="0"/>
+                              <p:cond delay="31850"/>
                             </p:stCondLst>
                             <p:childTnLst>
                               <p:par>
-                                <p:cTn id="265" presetID="22" presetClass="entr" presetSubtype="4" fill="hold" nodeType="clickEffect">
+                                <p:cTn id="217" presetID="22" presetClass="entr" presetSubtype="4" fill="hold" nodeType="afterEffect">
                                   <p:stCondLst>
                                     <p:cond delay="0"/>
                                   </p:stCondLst>
                                   <p:childTnLst>
                                     <p:set>
                                       <p:cBhvr>
-                                        <p:cTn id="266" dur="1" fill="hold">
+                                        <p:cTn id="218" dur="1" fill="hold">
                                           <p:stCondLst>
                                             <p:cond delay="0"/>
                                           </p:stCondLst>
@@ -10820,7 +10290,7 @@
                                     </p:set>
                                     <p:animEffect transition="in" filter="wipe(down)">
                                       <p:cBhvr>
-                                        <p:cTn id="267" dur="500"/>
+                                        <p:cTn id="219" dur="500"/>
                                         <p:tgtEl>
                                           <p:spTgt spid="161"/>
                                         </p:tgtEl>
@@ -10832,30 +10302,21 @@
                             </p:childTnLst>
                           </p:cTn>
                         </p:par>
-                      </p:childTnLst>
-                    </p:cTn>
-                  </p:par>
-                  <p:par>
-                    <p:cTn id="268" fill="hold">
-                      <p:stCondLst>
-                        <p:cond delay="indefinite"/>
-                      </p:stCondLst>
-                      <p:childTnLst>
                         <p:par>
-                          <p:cTn id="269" fill="hold">
+                          <p:cTn id="220" fill="hold">
                             <p:stCondLst>
-                              <p:cond delay="0"/>
+                              <p:cond delay="32350"/>
                             </p:stCondLst>
                             <p:childTnLst>
                               <p:par>
-                                <p:cTn id="270" presetID="26" presetClass="emph" presetSubtype="0" fill="hold" grpId="7" nodeType="clickEffect">
+                                <p:cTn id="221" presetID="26" presetClass="emph" presetSubtype="0" fill="hold" grpId="7" nodeType="afterEffect">
                                   <p:stCondLst>
                                     <p:cond delay="0"/>
                                   </p:stCondLst>
                                   <p:childTnLst>
                                     <p:animEffect transition="out" filter="fade">
                                       <p:cBhvr>
-                                        <p:cTn id="271" dur="500" tmFilter="0, 0; .2, .5; .8, .5; 1, 0"/>
+                                        <p:cTn id="222" dur="500" tmFilter="0, 0; .2, .5; .8, .5; 1, 0"/>
                                         <p:tgtEl>
                                           <p:spTgt spid="59"/>
                                         </p:tgtEl>
@@ -10863,7 +10324,7 @@
                                     </p:animEffect>
                                     <p:animScale>
                                       <p:cBhvr>
-                                        <p:cTn id="272" dur="250" autoRev="1" fill="hold"/>
+                                        <p:cTn id="223" dur="250" autoRev="1" fill="hold"/>
                                         <p:tgtEl>
                                           <p:spTgt spid="59"/>
                                         </p:tgtEl>
@@ -10876,30 +10337,21 @@
                             </p:childTnLst>
                           </p:cTn>
                         </p:par>
-                      </p:childTnLst>
-                    </p:cTn>
-                  </p:par>
-                  <p:par>
-                    <p:cTn id="273" fill="hold">
-                      <p:stCondLst>
-                        <p:cond delay="indefinite"/>
-                      </p:stCondLst>
-                      <p:childTnLst>
                         <p:par>
-                          <p:cTn id="274" fill="hold">
+                          <p:cTn id="224" fill="hold">
                             <p:stCondLst>
-                              <p:cond delay="0"/>
+                              <p:cond delay="32850"/>
                             </p:stCondLst>
                             <p:childTnLst>
                               <p:par>
-                                <p:cTn id="275" presetID="10" presetClass="exit" presetSubtype="0" fill="hold" nodeType="clickEffect">
+                                <p:cTn id="225" presetID="10" presetClass="exit" presetSubtype="0" fill="hold" nodeType="afterEffect">
                                   <p:stCondLst>
                                     <p:cond delay="0"/>
                                   </p:stCondLst>
                                   <p:childTnLst>
                                     <p:animEffect transition="out" filter="fade">
                                       <p:cBhvr>
-                                        <p:cTn id="276" dur="500"/>
+                                        <p:cTn id="226" dur="500"/>
                                         <p:tgtEl>
                                           <p:spTgt spid="161"/>
                                         </p:tgtEl>
@@ -10907,7 +10359,7 @@
                                     </p:animEffect>
                                     <p:set>
                                       <p:cBhvr>
-                                        <p:cTn id="277" dur="1" fill="hold">
+                                        <p:cTn id="227" dur="1" fill="hold">
                                           <p:stCondLst>
                                             <p:cond delay="499"/>
                                           </p:stCondLst>
@@ -10929,30 +10381,21 @@
                             </p:childTnLst>
                           </p:cTn>
                         </p:par>
-                      </p:childTnLst>
-                    </p:cTn>
-                  </p:par>
-                  <p:par>
-                    <p:cTn id="278" fill="hold">
-                      <p:stCondLst>
-                        <p:cond delay="indefinite"/>
-                      </p:stCondLst>
-                      <p:childTnLst>
                         <p:par>
-                          <p:cTn id="279" fill="hold">
+                          <p:cTn id="228" fill="hold">
                             <p:stCondLst>
-                              <p:cond delay="0"/>
+                              <p:cond delay="33350"/>
                             </p:stCondLst>
                             <p:childTnLst>
                               <p:par>
-                                <p:cTn id="280" presetID="10" presetClass="entr" presetSubtype="0" fill="hold" grpId="0" nodeType="clickEffect">
+                                <p:cTn id="229" presetID="10" presetClass="entr" presetSubtype="0" fill="hold" grpId="0" nodeType="afterEffect">
                                   <p:stCondLst>
                                     <p:cond delay="0"/>
                                   </p:stCondLst>
                                   <p:childTnLst>
                                     <p:set>
                                       <p:cBhvr>
-                                        <p:cTn id="281" dur="1" fill="hold">
+                                        <p:cTn id="230" dur="1" fill="hold">
                                           <p:stCondLst>
                                             <p:cond delay="0"/>
                                           </p:stCondLst>
@@ -10970,7 +10413,7 @@
                                     </p:set>
                                     <p:animEffect transition="in" filter="fade">
                                       <p:cBhvr>
-                                        <p:cTn id="282" dur="500"/>
+                                        <p:cTn id="231" dur="500"/>
                                         <p:tgtEl>
                                           <p:spTgt spid="116"/>
                                         </p:tgtEl>
@@ -10982,30 +10425,21 @@
                             </p:childTnLst>
                           </p:cTn>
                         </p:par>
-                      </p:childTnLst>
-                    </p:cTn>
-                  </p:par>
-                  <p:par>
-                    <p:cTn id="283" fill="hold">
-                      <p:stCondLst>
-                        <p:cond delay="indefinite"/>
-                      </p:stCondLst>
-                      <p:childTnLst>
                         <p:par>
-                          <p:cTn id="284" fill="hold">
+                          <p:cTn id="232" fill="hold">
                             <p:stCondLst>
-                              <p:cond delay="0"/>
+                              <p:cond delay="33850"/>
                             </p:stCondLst>
                             <p:childTnLst>
                               <p:par>
-                                <p:cTn id="285" presetID="22" presetClass="entr" presetSubtype="4" fill="hold" nodeType="clickEffect">
+                                <p:cTn id="233" presetID="22" presetClass="entr" presetSubtype="4" fill="hold" nodeType="afterEffect">
                                   <p:stCondLst>
                                     <p:cond delay="0"/>
                                   </p:stCondLst>
                                   <p:childTnLst>
                                     <p:set>
                                       <p:cBhvr>
-                                        <p:cTn id="286" dur="1" fill="hold">
+                                        <p:cTn id="234" dur="1" fill="hold">
                                           <p:stCondLst>
                                             <p:cond delay="0"/>
                                           </p:stCondLst>
@@ -11023,7 +10457,7 @@
                                     </p:set>
                                     <p:animEffect transition="in" filter="wipe(down)">
                                       <p:cBhvr>
-                                        <p:cTn id="287" dur="500"/>
+                                        <p:cTn id="235" dur="500"/>
                                         <p:tgtEl>
                                           <p:spTgt spid="96"/>
                                         </p:tgtEl>
@@ -11035,23 +10469,14 @@
                             </p:childTnLst>
                           </p:cTn>
                         </p:par>
-                      </p:childTnLst>
-                    </p:cTn>
-                  </p:par>
-                  <p:par>
-                    <p:cTn id="288" fill="hold">
-                      <p:stCondLst>
-                        <p:cond delay="indefinite"/>
-                      </p:stCondLst>
-                      <p:childTnLst>
                         <p:par>
-                          <p:cTn id="289" fill="hold">
+                          <p:cTn id="236" fill="hold">
                             <p:stCondLst>
-                              <p:cond delay="0"/>
+                              <p:cond delay="34350"/>
                             </p:stCondLst>
                             <p:childTnLst>
                               <p:par>
-                                <p:cTn id="290" presetID="10" presetClass="entr" presetSubtype="0" fill="hold" nodeType="clickEffect">
+                                <p:cTn id="237" presetID="10" presetClass="entr" presetSubtype="0" fill="hold" nodeType="afterEffect">
                                   <p:stCondLst>
                                     <p:cond delay="0"/>
                                   </p:stCondLst>
@@ -11061,7 +10486,7 @@
                                   <p:childTnLst>
                                     <p:set>
                                       <p:cBhvr>
-                                        <p:cTn id="291" dur="1" fill="hold">
+                                        <p:cTn id="238" dur="1" fill="hold">
                                           <p:stCondLst>
                                             <p:cond delay="0"/>
                                           </p:stCondLst>
@@ -11083,7 +10508,7 @@
                                     </p:set>
                                     <p:animEffect transition="in" filter="fade">
                                       <p:cBhvr>
-                                        <p:cTn id="292" dur="500"/>
+                                        <p:cTn id="239" dur="500"/>
                                         <p:tgtEl>
                                           <p:spTgt spid="162">
                                             <p:txEl>
@@ -11099,30 +10524,21 @@
                             </p:childTnLst>
                           </p:cTn>
                         </p:par>
-                      </p:childTnLst>
-                    </p:cTn>
-                  </p:par>
-                  <p:par>
-                    <p:cTn id="293" fill="hold">
-                      <p:stCondLst>
-                        <p:cond delay="indefinite"/>
-                      </p:stCondLst>
-                      <p:childTnLst>
                         <p:par>
-                          <p:cTn id="294" fill="hold">
+                          <p:cTn id="240" fill="hold">
                             <p:stCondLst>
-                              <p:cond delay="0"/>
+                              <p:cond delay="35150"/>
                             </p:stCondLst>
                             <p:childTnLst>
                               <p:par>
-                                <p:cTn id="295" presetID="10" presetClass="entr" presetSubtype="0" fill="hold" nodeType="clickEffect">
+                                <p:cTn id="241" presetID="10" presetClass="entr" presetSubtype="0" fill="hold" nodeType="afterEffect">
                                   <p:stCondLst>
                                     <p:cond delay="0"/>
                                   </p:stCondLst>
                                   <p:childTnLst>
                                     <p:set>
                                       <p:cBhvr>
-                                        <p:cTn id="296" dur="1" fill="hold">
+                                        <p:cTn id="242" dur="1" fill="hold">
                                           <p:stCondLst>
                                             <p:cond delay="0"/>
                                           </p:stCondLst>
@@ -11140,114 +10556,9 @@
                                     </p:set>
                                     <p:animEffect transition="in" filter="fade">
                                       <p:cBhvr>
-                                        <p:cTn id="297" dur="500"/>
+                                        <p:cTn id="243" dur="500"/>
                                         <p:tgtEl>
                                           <p:spTgt spid="107"/>
-                                        </p:tgtEl>
-                                      </p:cBhvr>
-                                    </p:animEffect>
-                                  </p:childTnLst>
-                                </p:cTn>
-                              </p:par>
-                              <p:par>
-                                <p:cTn id="298" presetID="10" presetClass="entr" presetSubtype="0" fill="hold" nodeType="withEffect">
-                                  <p:stCondLst>
-                                    <p:cond delay="0"/>
-                                  </p:stCondLst>
-                                  <p:childTnLst>
-                                    <p:set>
-                                      <p:cBhvr>
-                                        <p:cTn id="299" dur="1" fill="hold">
-                                          <p:stCondLst>
-                                            <p:cond delay="0"/>
-                                          </p:stCondLst>
-                                        </p:cTn>
-                                        <p:tgtEl>
-                                          <p:spTgt spid="108"/>
-                                        </p:tgtEl>
-                                        <p:attrNameLst>
-                                          <p:attrName>style.visibility</p:attrName>
-                                        </p:attrNameLst>
-                                      </p:cBhvr>
-                                      <p:to>
-                                        <p:strVal val="visible"/>
-                                      </p:to>
-                                    </p:set>
-                                    <p:animEffect transition="in" filter="fade">
-                                      <p:cBhvr>
-                                        <p:cTn id="300" dur="500"/>
-                                        <p:tgtEl>
-                                          <p:spTgt spid="108"/>
-                                        </p:tgtEl>
-                                      </p:cBhvr>
-                                    </p:animEffect>
-                                  </p:childTnLst>
-                                </p:cTn>
-                              </p:par>
-                              <p:par>
-                                <p:cTn id="301" presetID="10" presetClass="entr" presetSubtype="0" fill="hold" nodeType="withEffect">
-                                  <p:stCondLst>
-                                    <p:cond delay="0"/>
-                                  </p:stCondLst>
-                                  <p:childTnLst>
-                                    <p:set>
-                                      <p:cBhvr>
-                                        <p:cTn id="302" dur="1" fill="hold">
-                                          <p:stCondLst>
-                                            <p:cond delay="0"/>
-                                          </p:stCondLst>
-                                        </p:cTn>
-                                        <p:tgtEl>
-                                          <p:spTgt spid="109"/>
-                                        </p:tgtEl>
-                                        <p:attrNameLst>
-                                          <p:attrName>style.visibility</p:attrName>
-                                        </p:attrNameLst>
-                                      </p:cBhvr>
-                                      <p:to>
-                                        <p:strVal val="visible"/>
-                                      </p:to>
-                                    </p:set>
-                                    <p:animEffect transition="in" filter="fade">
-                                      <p:cBhvr>
-                                        <p:cTn id="303" dur="500"/>
-                                        <p:tgtEl>
-                                          <p:spTgt spid="109"/>
-                                        </p:tgtEl>
-                                      </p:cBhvr>
-                                    </p:animEffect>
-                                  </p:childTnLst>
-                                </p:cTn>
-                              </p:par>
-                              <p:par>
-                                <p:cTn id="304" presetID="10" presetClass="entr" presetSubtype="0" fill="hold" nodeType="withEffect">
-                                  <p:stCondLst>
-                                    <p:cond delay="0"/>
-                                  </p:stCondLst>
-                                  <p:childTnLst>
-                                    <p:set>
-                                      <p:cBhvr>
-                                        <p:cTn id="305" dur="1" fill="hold">
-                                          <p:stCondLst>
-                                            <p:cond delay="0"/>
-                                          </p:stCondLst>
-                                        </p:cTn>
-                                        <p:tgtEl>
-                                          <p:spTgt spid="117"/>
-                                        </p:tgtEl>
-                                        <p:attrNameLst>
-                                          <p:attrName>style.visibility</p:attrName>
-                                        </p:attrNameLst>
-                                      </p:cBhvr>
-                                      <p:to>
-                                        <p:strVal val="visible"/>
-                                      </p:to>
-                                    </p:set>
-                                    <p:animEffect transition="in" filter="fade">
-                                      <p:cBhvr>
-                                        <p:cTn id="306" dur="500"/>
-                                        <p:tgtEl>
-                                          <p:spTgt spid="117"/>
                                         </p:tgtEl>
                                       </p:cBhvr>
                                     </p:animEffect>
@@ -11257,30 +10568,200 @@
                             </p:childTnLst>
                           </p:cTn>
                         </p:par>
-                      </p:childTnLst>
-                    </p:cTn>
-                  </p:par>
-                  <p:par>
-                    <p:cTn id="307" fill="hold">
-                      <p:stCondLst>
-                        <p:cond delay="indefinite"/>
-                      </p:stCondLst>
-                      <p:childTnLst>
                         <p:par>
-                          <p:cTn id="308" fill="hold">
+                          <p:cTn id="244" fill="hold">
                             <p:stCondLst>
-                              <p:cond delay="0"/>
+                              <p:cond delay="35650"/>
                             </p:stCondLst>
                             <p:childTnLst>
                               <p:par>
-                                <p:cTn id="309" presetID="0" presetClass="path" presetSubtype="0" accel="50000" decel="50000" fill="hold" nodeType="clickEffect">
+                                <p:cTn id="245" presetID="10" presetClass="entr" presetSubtype="0" fill="hold" nodeType="afterEffect">
+                                  <p:stCondLst>
+                                    <p:cond delay="0"/>
+                                  </p:stCondLst>
+                                  <p:childTnLst>
+                                    <p:set>
+                                      <p:cBhvr>
+                                        <p:cTn id="246" dur="1" fill="hold">
+                                          <p:stCondLst>
+                                            <p:cond delay="0"/>
+                                          </p:stCondLst>
+                                        </p:cTn>
+                                        <p:tgtEl>
+                                          <p:spTgt spid="108"/>
+                                        </p:tgtEl>
+                                        <p:attrNameLst>
+                                          <p:attrName>style.visibility</p:attrName>
+                                        </p:attrNameLst>
+                                      </p:cBhvr>
+                                      <p:to>
+                                        <p:strVal val="visible"/>
+                                      </p:to>
+                                    </p:set>
+                                    <p:animEffect transition="in" filter="fade">
+                                      <p:cBhvr>
+                                        <p:cTn id="247" dur="500"/>
+                                        <p:tgtEl>
+                                          <p:spTgt spid="108"/>
+                                        </p:tgtEl>
+                                      </p:cBhvr>
+                                    </p:animEffect>
+                                  </p:childTnLst>
+                                </p:cTn>
+                              </p:par>
+                            </p:childTnLst>
+                          </p:cTn>
+                        </p:par>
+                        <p:par>
+                          <p:cTn id="248" fill="hold">
+                            <p:stCondLst>
+                              <p:cond delay="36150"/>
+                            </p:stCondLst>
+                            <p:childTnLst>
+                              <p:par>
+                                <p:cTn id="249" presetID="10" presetClass="entr" presetSubtype="0" fill="hold" nodeType="afterEffect">
+                                  <p:stCondLst>
+                                    <p:cond delay="0"/>
+                                  </p:stCondLst>
+                                  <p:childTnLst>
+                                    <p:set>
+                                      <p:cBhvr>
+                                        <p:cTn id="250" dur="1" fill="hold">
+                                          <p:stCondLst>
+                                            <p:cond delay="0"/>
+                                          </p:stCondLst>
+                                        </p:cTn>
+                                        <p:tgtEl>
+                                          <p:spTgt spid="109"/>
+                                        </p:tgtEl>
+                                        <p:attrNameLst>
+                                          <p:attrName>style.visibility</p:attrName>
+                                        </p:attrNameLst>
+                                      </p:cBhvr>
+                                      <p:to>
+                                        <p:strVal val="visible"/>
+                                      </p:to>
+                                    </p:set>
+                                    <p:animEffect transition="in" filter="fade">
+                                      <p:cBhvr>
+                                        <p:cTn id="251" dur="500"/>
+                                        <p:tgtEl>
+                                          <p:spTgt spid="109"/>
+                                        </p:tgtEl>
+                                      </p:cBhvr>
+                                    </p:animEffect>
+                                  </p:childTnLst>
+                                </p:cTn>
+                              </p:par>
+                            </p:childTnLst>
+                          </p:cTn>
+                        </p:par>
+                        <p:par>
+                          <p:cTn id="252" fill="hold">
+                            <p:stCondLst>
+                              <p:cond delay="36650"/>
+                            </p:stCondLst>
+                            <p:childTnLst>
+                              <p:par>
+                                <p:cTn id="253" presetID="10" presetClass="entr" presetSubtype="0" fill="hold" nodeType="afterEffect">
+                                  <p:stCondLst>
+                                    <p:cond delay="0"/>
+                                  </p:stCondLst>
+                                  <p:childTnLst>
+                                    <p:set>
+                                      <p:cBhvr>
+                                        <p:cTn id="254" dur="1" fill="hold">
+                                          <p:stCondLst>
+                                            <p:cond delay="0"/>
+                                          </p:stCondLst>
+                                        </p:cTn>
+                                        <p:tgtEl>
+                                          <p:spTgt spid="117"/>
+                                        </p:tgtEl>
+                                        <p:attrNameLst>
+                                          <p:attrName>style.visibility</p:attrName>
+                                        </p:attrNameLst>
+                                      </p:cBhvr>
+                                      <p:to>
+                                        <p:strVal val="visible"/>
+                                      </p:to>
+                                    </p:set>
+                                    <p:animEffect transition="in" filter="fade">
+                                      <p:cBhvr>
+                                        <p:cTn id="255" dur="500"/>
+                                        <p:tgtEl>
+                                          <p:spTgt spid="117"/>
+                                        </p:tgtEl>
+                                      </p:cBhvr>
+                                    </p:animEffect>
+                                  </p:childTnLst>
+                                </p:cTn>
+                              </p:par>
+                            </p:childTnLst>
+                          </p:cTn>
+                        </p:par>
+                        <p:par>
+                          <p:cTn id="256" fill="hold">
+                            <p:stCondLst>
+                              <p:cond delay="37150"/>
+                            </p:stCondLst>
+                            <p:childTnLst>
+                              <p:par>
+                                <p:cTn id="257" presetID="10" presetClass="entr" presetSubtype="0" fill="hold" grpId="0" nodeType="afterEffect">
+                                  <p:stCondLst>
+                                    <p:cond delay="0"/>
+                                  </p:stCondLst>
+                                  <p:iterate type="lt">
+                                    <p:tmPct val="10000"/>
+                                  </p:iterate>
+                                  <p:childTnLst>
+                                    <p:set>
+                                      <p:cBhvr>
+                                        <p:cTn id="258" dur="1" fill="hold">
+                                          <p:stCondLst>
+                                            <p:cond delay="0"/>
+                                          </p:stCondLst>
+                                        </p:cTn>
+                                        <p:tgtEl>
+                                          <p:spTgt spid="3"/>
+                                        </p:tgtEl>
+                                        <p:attrNameLst>
+                                          <p:attrName>style.visibility</p:attrName>
+                                        </p:attrNameLst>
+                                      </p:cBhvr>
+                                      <p:to>
+                                        <p:strVal val="visible"/>
+                                      </p:to>
+                                    </p:set>
+                                    <p:animEffect transition="in" filter="fade">
+                                      <p:cBhvr>
+                                        <p:cTn id="259" dur="500"/>
+                                        <p:tgtEl>
+                                          <p:spTgt spid="3"/>
+                                        </p:tgtEl>
+                                      </p:cBhvr>
+                                    </p:animEffect>
+                                  </p:childTnLst>
+                                </p:cTn>
+                              </p:par>
+                            </p:childTnLst>
+                          </p:cTn>
+                        </p:par>
+                        <p:par>
+                          <p:cTn id="260" fill="hold">
+                            <p:stCondLst>
+                              <p:cond delay="38750"/>
+                            </p:stCondLst>
+                            <p:childTnLst>
+                              <p:par>
+                                <p:cTn id="261" presetID="0" presetClass="path" presetSubtype="0" accel="50000" decel="50000" fill="hold" nodeType="afterEffect">
                                   <p:stCondLst>
                                     <p:cond delay="0"/>
                                   </p:stCondLst>
                                   <p:childTnLst>
                                     <p:animMotion origin="layout" path="M -0.00078 -0.02223 L -0.00078 -0.02199 C 0.00052 -0.025 0.0026 -0.0301 0.0043 -0.03264 C 0.0056 -0.03426 0.00833 -0.03797 0.00937 -0.03889 C 0.01341 -0.0419 0.01081 -0.04005 0.01484 -0.04236 C 0.01523 -0.04236 0.01562 -0.04283 0.01601 -0.04306 C 0.01784 -0.04352 0.01966 -0.04375 0.02148 -0.04445 C 0.02213 -0.04445 0.02279 -0.04491 0.02344 -0.04514 C 0.02604 -0.04537 0.02865 -0.04561 0.03125 -0.04561 C 0.03698 -0.04468 0.03841 -0.04491 0.04336 -0.04236 C 0.04401 -0.0419 0.04453 -0.04144 0.04492 -0.04098 C 0.04831 -0.03611 0.04948 -0.03056 0.05156 -0.02361 C 0.05325 -0.01829 0.05495 -0.01297 0.05625 -0.00764 C 0.05963 0.00625 0.05963 0.00856 0.06094 0.02083 C 0.06133 0.03541 0.06185 0.04282 0.06055 0.05764 C 0.06029 0.0618 0.05937 0.06574 0.05859 0.06944 C 0.05573 0.08379 0.05338 0.09236 0.04805 0.10486 C 0.04362 0.11574 0.03854 0.12592 0.03359 0.13611 C 0.02995 0.14421 0.02786 0.14884 0.02305 0.15486 C 0.02018 0.15856 0.00703 0.17453 0.00117 0.17916 C -0.00951 0.18796 -0.03008 0.19768 -0.03828 0.2 L -0.05234 0.20416 C -0.0543 0.20486 -0.05625 0.20555 -0.0582 0.20625 C -0.06055 0.2074 -0.06276 0.20902 -0.06524 0.20972 C -0.06927 0.21111 -0.07357 0.21157 -0.07774 0.2125 C -0.07982 0.21365 -0.08177 0.21527 -0.08399 0.21597 C -0.08581 0.21689 -0.0974 0.22106 -0.10156 0.22152 C -0.10417 0.22199 -0.10703 0.22199 -0.10977 0.22222 C -0.11107 0.22268 -0.11224 0.22338 -0.11367 0.22361 C -0.12109 0.22523 -0.14115 0.2243 -0.14245 0.2243 " pathEditMode="relative" rAng="0" ptsTypes="AAAAAAAAAAAAAAAAAAAAAAAAAAAAAA">
                                       <p:cBhvr>
-                                        <p:cTn id="310" dur="2000" fill="hold"/>
+                                        <p:cTn id="262" dur="2000" fill="hold"/>
                                         <p:tgtEl>
                                           <p:spTgt spid="107"/>
                                         </p:tgtEl>
@@ -11297,30 +10778,21 @@
                             </p:childTnLst>
                           </p:cTn>
                         </p:par>
-                      </p:childTnLst>
-                    </p:cTn>
-                  </p:par>
-                  <p:par>
-                    <p:cTn id="311" fill="hold">
-                      <p:stCondLst>
-                        <p:cond delay="indefinite"/>
-                      </p:stCondLst>
-                      <p:childTnLst>
                         <p:par>
-                          <p:cTn id="312" fill="hold">
+                          <p:cTn id="263" fill="hold">
                             <p:stCondLst>
-                              <p:cond delay="0"/>
+                              <p:cond delay="40750"/>
                             </p:stCondLst>
                             <p:childTnLst>
                               <p:par>
-                                <p:cTn id="313" presetID="10" presetClass="entr" presetSubtype="0" fill="hold" grpId="0" nodeType="clickEffect">
+                                <p:cTn id="264" presetID="10" presetClass="entr" presetSubtype="0" fill="hold" grpId="0" nodeType="afterEffect">
                                   <p:stCondLst>
                                     <p:cond delay="0"/>
                                   </p:stCondLst>
                                   <p:childTnLst>
                                     <p:set>
                                       <p:cBhvr>
-                                        <p:cTn id="314" dur="1" fill="hold">
+                                        <p:cTn id="265" dur="1" fill="hold">
                                           <p:stCondLst>
                                             <p:cond delay="0"/>
                                           </p:stCondLst>
@@ -11338,7 +10810,7 @@
                                     </p:set>
                                     <p:animEffect transition="in" filter="fade">
                                       <p:cBhvr>
-                                        <p:cTn id="315" dur="500"/>
+                                        <p:cTn id="266" dur="500"/>
                                         <p:tgtEl>
                                           <p:spTgt spid="163"/>
                                         </p:tgtEl>
@@ -11350,30 +10822,21 @@
                             </p:childTnLst>
                           </p:cTn>
                         </p:par>
-                      </p:childTnLst>
-                    </p:cTn>
-                  </p:par>
-                  <p:par>
-                    <p:cTn id="316" fill="hold">
-                      <p:stCondLst>
-                        <p:cond delay="indefinite"/>
-                      </p:stCondLst>
-                      <p:childTnLst>
                         <p:par>
-                          <p:cTn id="317" fill="hold">
+                          <p:cTn id="267" fill="hold">
                             <p:stCondLst>
-                              <p:cond delay="0"/>
+                              <p:cond delay="41250"/>
                             </p:stCondLst>
                             <p:childTnLst>
                               <p:par>
-                                <p:cTn id="318" presetID="10" presetClass="entr" presetSubtype="0" fill="hold" grpId="0" nodeType="clickEffect">
+                                <p:cTn id="268" presetID="10" presetClass="entr" presetSubtype="0" fill="hold" grpId="0" nodeType="afterEffect">
                                   <p:stCondLst>
                                     <p:cond delay="0"/>
                                   </p:stCondLst>
                                   <p:childTnLst>
                                     <p:set>
                                       <p:cBhvr>
-                                        <p:cTn id="319" dur="1" fill="hold">
+                                        <p:cTn id="269" dur="1" fill="hold">
                                           <p:stCondLst>
                                             <p:cond delay="0"/>
                                           </p:stCondLst>
@@ -11391,7 +10854,7 @@
                                     </p:set>
                                     <p:animEffect transition="in" filter="fade">
                                       <p:cBhvr>
-                                        <p:cTn id="320" dur="500"/>
+                                        <p:cTn id="270" dur="500"/>
                                         <p:tgtEl>
                                           <p:spTgt spid="167"/>
                                         </p:tgtEl>
@@ -11403,30 +10866,21 @@
                             </p:childTnLst>
                           </p:cTn>
                         </p:par>
-                      </p:childTnLst>
-                    </p:cTn>
-                  </p:par>
-                  <p:par>
-                    <p:cTn id="321" fill="hold">
-                      <p:stCondLst>
-                        <p:cond delay="indefinite"/>
-                      </p:stCondLst>
-                      <p:childTnLst>
                         <p:par>
-                          <p:cTn id="322" fill="hold">
+                          <p:cTn id="271" fill="hold">
                             <p:stCondLst>
-                              <p:cond delay="0"/>
+                              <p:cond delay="41750"/>
                             </p:stCondLst>
                             <p:childTnLst>
                               <p:par>
-                                <p:cTn id="323" presetID="10" presetClass="entr" presetSubtype="0" fill="hold" nodeType="clickEffect">
+                                <p:cTn id="272" presetID="10" presetClass="entr" presetSubtype="0" fill="hold" nodeType="afterEffect">
                                   <p:stCondLst>
                                     <p:cond delay="0"/>
                                   </p:stCondLst>
                                   <p:childTnLst>
                                     <p:set>
                                       <p:cBhvr>
-                                        <p:cTn id="324" dur="1" fill="hold">
+                                        <p:cTn id="273" dur="1" fill="hold">
                                           <p:stCondLst>
                                             <p:cond delay="0"/>
                                           </p:stCondLst>
@@ -11444,7 +10898,7 @@
                                     </p:set>
                                     <p:animEffect transition="in" filter="fade">
                                       <p:cBhvr>
-                                        <p:cTn id="325" dur="500"/>
+                                        <p:cTn id="274" dur="500"/>
                                         <p:tgtEl>
                                           <p:spTgt spid="121"/>
                                         </p:tgtEl>
@@ -11456,30 +10910,21 @@
                             </p:childTnLst>
                           </p:cTn>
                         </p:par>
-                      </p:childTnLst>
-                    </p:cTn>
-                  </p:par>
-                  <p:par>
-                    <p:cTn id="326" fill="hold">
-                      <p:stCondLst>
-                        <p:cond delay="indefinite"/>
-                      </p:stCondLst>
-                      <p:childTnLst>
                         <p:par>
-                          <p:cTn id="327" fill="hold">
+                          <p:cTn id="275" fill="hold">
                             <p:stCondLst>
-                              <p:cond delay="0"/>
+                              <p:cond delay="42250"/>
                             </p:stCondLst>
                             <p:childTnLst>
                               <p:par>
-                                <p:cTn id="328" presetID="0" presetClass="path" presetSubtype="0" accel="50000" decel="50000" fill="hold" nodeType="clickEffect">
+                                <p:cTn id="276" presetID="0" presetClass="path" presetSubtype="0" accel="50000" decel="50000" fill="hold" nodeType="afterEffect">
                                   <p:stCondLst>
                                     <p:cond delay="0"/>
                                   </p:stCondLst>
                                   <p:childTnLst>
                                     <p:animMotion origin="layout" path="M 0.02943 -0.00185 L 0.02943 -0.00162 C 0.02995 -0.00254 0.03763 -0.01064 0.04036 -0.01111 L 0.04505 -0.01157 C 0.0474 -0.01111 0.04974 -0.01064 0.05208 -0.00972 C 0.0526 -0.00949 0.05299 -0.00856 0.05365 -0.00833 C 0.05391 -0.00787 0.05443 -0.00787 0.05482 -0.0074 C 0.05638 -0.00532 0.05703 -0.00486 0.05833 -0.00138 C 0.05859 -0.00023 0.05872 0.00116 0.05911 0.00232 C 0.05924 0.00324 0.05963 0.00417 0.0599 0.0051 C 0.0595 0.01482 0.05963 0.02454 0.05872 0.03426 C 0.05807 0.03982 0.05638 0.04491 0.05521 0.05 C 0.05365 0.05625 0.04935 0.07199 0.0474 0.07732 C 0.04544 0.08241 0.04349 0.0875 0.04154 0.0926 C 0.03711 0.10348 0.03398 0.10996 0.02786 0.12084 C 0.0263 0.12362 0.02461 0.12639 0.02318 0.12917 C 0.02187 0.13149 0.02096 0.13426 0.01966 0.13612 C 0.01588 0.14213 0.00482 0.15811 -0.00065 0.16389 C -0.00729 0.17084 -0.0138 0.17778 -0.02057 0.18334 L -0.03815 0.19815 C -0.0405 0.19977 -0.04258 0.20232 -0.04479 0.20371 C -0.06497 0.21551 -0.03802 0.19977 -0.05964 0.21112 C -0.06159 0.21227 -0.06341 0.21343 -0.0651 0.21482 C -0.06641 0.21574 -0.06745 0.21737 -0.06862 0.21806 C -0.07044 0.21922 -0.0724 0.21945 -0.07409 0.22037 C -0.07578 0.22107 -0.07721 0.22246 -0.07878 0.22315 C -0.08021 0.22362 -0.08164 0.22362 -0.08307 0.22362 L -0.13112 0.22454 L -0.14245 0.22362 " pathEditMode="relative" rAng="0" ptsTypes="AAAAAAAAAAAAAAAAAAAAAAAAAAAAA">
                                       <p:cBhvr>
-                                        <p:cTn id="329" dur="2000" fill="hold"/>
+                                        <p:cTn id="277" dur="2000" fill="hold"/>
                                         <p:tgtEl>
                                           <p:spTgt spid="108"/>
                                         </p:tgtEl>
@@ -11496,30 +10941,21 @@
                             </p:childTnLst>
                           </p:cTn>
                         </p:par>
-                      </p:childTnLst>
-                    </p:cTn>
-                  </p:par>
-                  <p:par>
-                    <p:cTn id="330" fill="hold">
-                      <p:stCondLst>
-                        <p:cond delay="indefinite"/>
-                      </p:stCondLst>
-                      <p:childTnLst>
                         <p:par>
-                          <p:cTn id="331" fill="hold">
+                          <p:cTn id="278" fill="hold">
                             <p:stCondLst>
-                              <p:cond delay="0"/>
+                              <p:cond delay="44250"/>
                             </p:stCondLst>
                             <p:childTnLst>
                               <p:par>
-                                <p:cTn id="332" presetID="10" presetClass="entr" presetSubtype="0" fill="hold" grpId="0" nodeType="clickEffect">
+                                <p:cTn id="279" presetID="10" presetClass="entr" presetSubtype="0" fill="hold" grpId="0" nodeType="afterEffect">
                                   <p:stCondLst>
                                     <p:cond delay="0"/>
                                   </p:stCondLst>
                                   <p:childTnLst>
                                     <p:set>
                                       <p:cBhvr>
-                                        <p:cTn id="333" dur="1" fill="hold">
+                                        <p:cTn id="280" dur="1" fill="hold">
                                           <p:stCondLst>
                                             <p:cond delay="0"/>
                                           </p:stCondLst>
@@ -11537,7 +10973,7 @@
                                     </p:set>
                                     <p:animEffect transition="in" filter="fade">
                                       <p:cBhvr>
-                                        <p:cTn id="334" dur="500"/>
+                                        <p:cTn id="281" dur="500"/>
                                         <p:tgtEl>
                                           <p:spTgt spid="164"/>
                                         </p:tgtEl>
@@ -11549,30 +10985,21 @@
                             </p:childTnLst>
                           </p:cTn>
                         </p:par>
-                      </p:childTnLst>
-                    </p:cTn>
-                  </p:par>
-                  <p:par>
-                    <p:cTn id="335" fill="hold">
-                      <p:stCondLst>
-                        <p:cond delay="indefinite"/>
-                      </p:stCondLst>
-                      <p:childTnLst>
                         <p:par>
-                          <p:cTn id="336" fill="hold">
+                          <p:cTn id="282" fill="hold">
                             <p:stCondLst>
-                              <p:cond delay="0"/>
+                              <p:cond delay="44750"/>
                             </p:stCondLst>
                             <p:childTnLst>
                               <p:par>
-                                <p:cTn id="337" presetID="10" presetClass="entr" presetSubtype="0" fill="hold" grpId="0" nodeType="clickEffect">
+                                <p:cTn id="283" presetID="10" presetClass="entr" presetSubtype="0" fill="hold" grpId="0" nodeType="afterEffect">
                                   <p:stCondLst>
                                     <p:cond delay="0"/>
                                   </p:stCondLst>
                                   <p:childTnLst>
                                     <p:set>
                                       <p:cBhvr>
-                                        <p:cTn id="338" dur="1" fill="hold">
+                                        <p:cTn id="284" dur="1" fill="hold">
                                           <p:stCondLst>
                                             <p:cond delay="0"/>
                                           </p:stCondLst>
@@ -11590,7 +11017,7 @@
                                     </p:set>
                                     <p:animEffect transition="in" filter="fade">
                                       <p:cBhvr>
-                                        <p:cTn id="339" dur="500"/>
+                                        <p:cTn id="285" dur="500"/>
                                         <p:tgtEl>
                                           <p:spTgt spid="170"/>
                                         </p:tgtEl>
@@ -11602,30 +11029,21 @@
                             </p:childTnLst>
                           </p:cTn>
                         </p:par>
-                      </p:childTnLst>
-                    </p:cTn>
-                  </p:par>
-                  <p:par>
-                    <p:cTn id="340" fill="hold">
-                      <p:stCondLst>
-                        <p:cond delay="indefinite"/>
-                      </p:stCondLst>
-                      <p:childTnLst>
                         <p:par>
-                          <p:cTn id="341" fill="hold">
+                          <p:cTn id="286" fill="hold">
                             <p:stCondLst>
-                              <p:cond delay="0"/>
+                              <p:cond delay="45250"/>
                             </p:stCondLst>
                             <p:childTnLst>
                               <p:par>
-                                <p:cTn id="342" presetID="10" presetClass="entr" presetSubtype="0" fill="hold" nodeType="clickEffect">
+                                <p:cTn id="287" presetID="10" presetClass="entr" presetSubtype="0" fill="hold" nodeType="afterEffect">
                                   <p:stCondLst>
                                     <p:cond delay="0"/>
                                   </p:stCondLst>
                                   <p:childTnLst>
                                     <p:set>
                                       <p:cBhvr>
-                                        <p:cTn id="343" dur="1" fill="hold">
+                                        <p:cTn id="288" dur="1" fill="hold">
                                           <p:stCondLst>
                                             <p:cond delay="0"/>
                                           </p:stCondLst>
@@ -11643,7 +11061,7 @@
                                     </p:set>
                                     <p:animEffect transition="in" filter="fade">
                                       <p:cBhvr>
-                                        <p:cTn id="344" dur="500"/>
+                                        <p:cTn id="289" dur="500"/>
                                         <p:tgtEl>
                                           <p:spTgt spid="125"/>
                                         </p:tgtEl>
@@ -11655,30 +11073,21 @@
                             </p:childTnLst>
                           </p:cTn>
                         </p:par>
-                      </p:childTnLst>
-                    </p:cTn>
-                  </p:par>
-                  <p:par>
-                    <p:cTn id="345" fill="hold">
-                      <p:stCondLst>
-                        <p:cond delay="indefinite"/>
-                      </p:stCondLst>
-                      <p:childTnLst>
                         <p:par>
-                          <p:cTn id="346" fill="hold">
+                          <p:cTn id="290" fill="hold">
                             <p:stCondLst>
-                              <p:cond delay="0"/>
+                              <p:cond delay="45750"/>
                             </p:stCondLst>
                             <p:childTnLst>
                               <p:par>
-                                <p:cTn id="347" presetID="0" presetClass="path" presetSubtype="0" accel="50000" decel="50000" fill="hold" nodeType="clickEffect">
+                                <p:cTn id="291" presetID="0" presetClass="path" presetSubtype="0" accel="50000" decel="50000" fill="hold" nodeType="afterEffect">
                                   <p:stCondLst>
                                     <p:cond delay="0"/>
                                   </p:stCondLst>
                                   <p:childTnLst>
-                                    <p:animMotion origin="layout" path="M 0.02982 -0.00208 L 0.02982 -0.00185 C 0.03138 -0.00278 0.03294 -0.00324 0.0345 -0.00416 C 0.03685 -0.00509 0.03763 -0.00579 0.03945 -0.00671 C 0.04075 -0.00648 0.04232 -0.00671 0.04336 -0.00555 C 0.04609 -0.00254 0.05039 0.00486 0.05039 0.00509 C 0.05221 0.0125 0.05325 0.01597 0.05404 0.02431 C 0.0543 0.02894 0.0543 0.03357 0.05443 0.0382 C 0.05299 0.06991 0.05534 0.07639 0.04883 0.09861 C 0.04505 0.11227 0.04154 0.11852 0.03555 0.12986 C 0.02904 0.14259 0.02331 0.15139 0.01445 0.16042 C 0.0095 0.16574 0.00456 0.17176 -0.00065 0.17639 C -0.02734 0.2 -0.01641 0.18959 -0.02956 0.19792 C -0.03177 0.19931 -0.03372 0.20116 -0.03581 0.20209 C -0.04662 0.20787 -0.0487 0.20764 -0.05925 0.21111 C -0.06068 0.21158 -0.06198 0.21204 -0.06315 0.2125 C -0.0655 0.21343 -0.06758 0.21482 -0.06992 0.21528 C -0.07995 0.21783 -0.08815 0.21759 -0.09831 0.21806 C -0.10287 0.21921 -0.10195 0.21898 -0.10768 0.21945 L -0.13555 0.22153 C -0.14024 0.22246 -0.13802 0.22222 -0.14206 0.22222 " pathEditMode="relative" rAng="0" ptsTypes="AAAAAAAAAAAAAAAAAAAAA">
-                                      <p:cBhvr>
-                                        <p:cTn id="348" dur="2000" fill="hold"/>
+                                    <p:animMotion origin="layout" path="M 0.0293 -0.00208 L 0.0293 -0.00185 C 0.03086 -0.00278 0.03242 -0.00324 0.03398 -0.00416 C 0.03633 -0.00509 0.03711 -0.00579 0.03893 -0.00671 C 0.04023 -0.00648 0.0418 -0.00671 0.04284 -0.00555 C 0.04557 -0.00254 0.04987 0.00486 0.04987 0.00509 C 0.05169 0.0125 0.05273 0.01597 0.05351 0.02431 C 0.05378 0.02894 0.05378 0.03357 0.05391 0.0382 C 0.05247 0.06991 0.05482 0.07639 0.04831 0.09861 C 0.04453 0.11227 0.04101 0.11852 0.03503 0.12986 C 0.02851 0.14259 0.02279 0.15139 0.01393 0.16042 C 0.00898 0.16574 0.00404 0.17176 -0.00117 0.17639 C -0.02787 0.2 -0.01693 0.18959 -0.03008 0.19792 C -0.03229 0.19931 -0.03425 0.20116 -0.03633 0.20209 C -0.04714 0.20787 -0.04922 0.20764 -0.05977 0.21111 C -0.0612 0.21158 -0.0625 0.21204 -0.06367 0.2125 C -0.06602 0.21343 -0.0681 0.21482 -0.07044 0.21528 C -0.08047 0.21783 -0.08867 0.21759 -0.09883 0.21806 C -0.10339 0.21921 -0.10247 0.21898 -0.1082 0.21945 L -0.13607 0.22153 C -0.14076 0.22246 -0.13854 0.22222 -0.14258 0.22222 " pathEditMode="relative" rAng="0" ptsTypes="AAAAAAAAAAAAAAAAAAAAA">
+                                      <p:cBhvr>
+                                        <p:cTn id="292" dur="2000" fill="hold"/>
                                         <p:tgtEl>
                                           <p:spTgt spid="109"/>
                                         </p:tgtEl>
@@ -11695,30 +11104,21 @@
                             </p:childTnLst>
                           </p:cTn>
                         </p:par>
-                      </p:childTnLst>
-                    </p:cTn>
-                  </p:par>
-                  <p:par>
-                    <p:cTn id="349" fill="hold">
-                      <p:stCondLst>
-                        <p:cond delay="indefinite"/>
-                      </p:stCondLst>
-                      <p:childTnLst>
                         <p:par>
-                          <p:cTn id="350" fill="hold">
+                          <p:cTn id="293" fill="hold">
                             <p:stCondLst>
-                              <p:cond delay="0"/>
+                              <p:cond delay="47750"/>
                             </p:stCondLst>
                             <p:childTnLst>
                               <p:par>
-                                <p:cTn id="351" presetID="10" presetClass="entr" presetSubtype="0" fill="hold" grpId="0" nodeType="clickEffect">
+                                <p:cTn id="294" presetID="10" presetClass="entr" presetSubtype="0" fill="hold" grpId="0" nodeType="afterEffect">
                                   <p:stCondLst>
                                     <p:cond delay="0"/>
                                   </p:stCondLst>
                                   <p:childTnLst>
                                     <p:set>
                                       <p:cBhvr>
-                                        <p:cTn id="352" dur="1" fill="hold">
+                                        <p:cTn id="295" dur="1" fill="hold">
                                           <p:stCondLst>
                                             <p:cond delay="0"/>
                                           </p:stCondLst>
@@ -11736,7 +11136,7 @@
                                     </p:set>
                                     <p:animEffect transition="in" filter="fade">
                                       <p:cBhvr>
-                                        <p:cTn id="353" dur="500"/>
+                                        <p:cTn id="296" dur="500"/>
                                         <p:tgtEl>
                                           <p:spTgt spid="165"/>
                                         </p:tgtEl>
@@ -11748,30 +11148,21 @@
                             </p:childTnLst>
                           </p:cTn>
                         </p:par>
-                      </p:childTnLst>
-                    </p:cTn>
-                  </p:par>
-                  <p:par>
-                    <p:cTn id="354" fill="hold">
-                      <p:stCondLst>
-                        <p:cond delay="indefinite"/>
-                      </p:stCondLst>
-                      <p:childTnLst>
                         <p:par>
-                          <p:cTn id="355" fill="hold">
+                          <p:cTn id="297" fill="hold">
                             <p:stCondLst>
-                              <p:cond delay="0"/>
+                              <p:cond delay="48250"/>
                             </p:stCondLst>
                             <p:childTnLst>
                               <p:par>
-                                <p:cTn id="356" presetID="10" presetClass="entr" presetSubtype="0" fill="hold" grpId="0" nodeType="clickEffect">
+                                <p:cTn id="298" presetID="10" presetClass="entr" presetSubtype="0" fill="hold" grpId="0" nodeType="afterEffect">
                                   <p:stCondLst>
                                     <p:cond delay="0"/>
                                   </p:stCondLst>
                                   <p:childTnLst>
                                     <p:set>
                                       <p:cBhvr>
-                                        <p:cTn id="357" dur="1" fill="hold">
+                                        <p:cTn id="299" dur="1" fill="hold">
                                           <p:stCondLst>
                                             <p:cond delay="0"/>
                                           </p:stCondLst>
@@ -11789,7 +11180,7 @@
                                     </p:set>
                                     <p:animEffect transition="in" filter="fade">
                                       <p:cBhvr>
-                                        <p:cTn id="358" dur="500"/>
+                                        <p:cTn id="300" dur="500"/>
                                         <p:tgtEl>
                                           <p:spTgt spid="171"/>
                                         </p:tgtEl>
@@ -11801,30 +11192,21 @@
                             </p:childTnLst>
                           </p:cTn>
                         </p:par>
-                      </p:childTnLst>
-                    </p:cTn>
-                  </p:par>
-                  <p:par>
-                    <p:cTn id="359" fill="hold">
-                      <p:stCondLst>
-                        <p:cond delay="indefinite"/>
-                      </p:stCondLst>
-                      <p:childTnLst>
                         <p:par>
-                          <p:cTn id="360" fill="hold">
+                          <p:cTn id="301" fill="hold">
                             <p:stCondLst>
-                              <p:cond delay="0"/>
+                              <p:cond delay="48750"/>
                             </p:stCondLst>
                             <p:childTnLst>
                               <p:par>
-                                <p:cTn id="361" presetID="10" presetClass="entr" presetSubtype="0" fill="hold" nodeType="clickEffect">
+                                <p:cTn id="302" presetID="10" presetClass="entr" presetSubtype="0" fill="hold" nodeType="afterEffect">
                                   <p:stCondLst>
                                     <p:cond delay="0"/>
                                   </p:stCondLst>
                                   <p:childTnLst>
                                     <p:set>
                                       <p:cBhvr>
-                                        <p:cTn id="362" dur="1" fill="hold">
+                                        <p:cTn id="303" dur="1" fill="hold">
                                           <p:stCondLst>
                                             <p:cond delay="0"/>
                                           </p:stCondLst>
@@ -11842,7 +11224,7 @@
                                     </p:set>
                                     <p:animEffect transition="in" filter="fade">
                                       <p:cBhvr>
-                                        <p:cTn id="363" dur="500"/>
+                                        <p:cTn id="304" dur="500"/>
                                         <p:tgtEl>
                                           <p:spTgt spid="129"/>
                                         </p:tgtEl>
@@ -11854,30 +11236,21 @@
                             </p:childTnLst>
                           </p:cTn>
                         </p:par>
-                      </p:childTnLst>
-                    </p:cTn>
-                  </p:par>
-                  <p:par>
-                    <p:cTn id="364" fill="hold">
-                      <p:stCondLst>
-                        <p:cond delay="indefinite"/>
-                      </p:stCondLst>
-                      <p:childTnLst>
                         <p:par>
-                          <p:cTn id="365" fill="hold">
+                          <p:cTn id="305" fill="hold">
                             <p:stCondLst>
-                              <p:cond delay="0"/>
+                              <p:cond delay="49250"/>
                             </p:stCondLst>
                             <p:childTnLst>
                               <p:par>
-                                <p:cTn id="366" presetID="0" presetClass="path" presetSubtype="0" accel="50000" decel="50000" fill="hold" nodeType="clickEffect">
+                                <p:cTn id="306" presetID="0" presetClass="path" presetSubtype="0" accel="50000" decel="50000" fill="hold" nodeType="afterEffect">
                                   <p:stCondLst>
                                     <p:cond delay="0"/>
                                   </p:stCondLst>
                                   <p:childTnLst>
-                                    <p:animMotion origin="layout" path="M 0.0306 0.00162 L 0.0306 0.00185 C 0.03281 -0.00139 0.03711 -0.00787 0.03971 -0.00949 C 0.04049 -0.00996 0.04128 -0.01019 0.04206 -0.01088 C 0.04271 -0.01111 0.04323 -0.01181 0.04388 -0.01227 C 0.0444 -0.0125 0.04492 -0.01273 0.04544 -0.01273 C 0.04674 -0.01273 0.04831 -0.0132 0.04935 -0.01227 C 0.05013 -0.01134 0.05026 -0.00949 0.05065 -0.0081 C 0.05325 0.00324 0.04935 -0.01111 0.05247 0.00023 C 0.05273 0.00254 0.05312 0.0044 0.05325 0.00671 C 0.05365 0.00949 0.05404 0.01875 0.05417 0.02106 C 0.05378 0.02893 0.05378 0.03704 0.05325 0.04467 C 0.05312 0.04699 0.0526 0.04907 0.05221 0.05116 C 0.05156 0.05393 0.05091 0.05671 0.05013 0.05949 C 0.04922 0.06319 0.04766 0.06574 0.04622 0.06921 C 0.04557 0.07083 0.04505 0.07291 0.0444 0.07477 C 0.04258 0.0794 0.04115 0.08449 0.03893 0.08866 C 0.02773 0.10833 0.03411 0.09815 0.02044 0.1169 C 0.01862 0.11944 0.01706 0.12268 0.01497 0.12477 C 0.00872 0.13125 0.00234 0.13704 -0.00378 0.14421 C -0.00742 0.14838 -0.00859 0.15023 -0.01315 0.15393 C -0.01537 0.15555 -0.01784 0.15671 -0.02018 0.15856 C -0.02135 0.15972 -0.0224 0.1618 -0.02357 0.16273 C -0.02826 0.1669 -0.03294 0.17083 -0.03763 0.17384 C -0.03867 0.17477 -0.03971 0.17546 -0.04076 0.17616 C -0.04258 0.17708 -0.04453 0.17778 -0.04622 0.17893 C -0.05013 0.18102 -0.05404 0.18264 -0.05768 0.18588 C -0.06367 0.19074 -0.07149 0.19768 -0.07747 0.20023 L -0.09362 0.20717 C -0.09518 0.2081 -0.09701 0.20833 -0.09857 0.20949 C -0.09987 0.20995 -0.10104 0.21065 -0.10221 0.21134 C -0.10274 0.2118 -0.10313 0.2125 -0.10378 0.21273 C -0.1151 0.21805 -0.1112 0.21643 -0.11966 0.21782 C -0.12096 0.21782 -0.12214 0.21805 -0.12331 0.21829 C -0.12461 0.21875 -0.12578 0.21944 -0.12721 0.21967 C -0.1306 0.22037 -0.13425 0.2206 -0.13763 0.22106 L -0.14232 0.22199 " pathEditMode="relative" rAng="0" ptsTypes="AAAAAAAAAAAAAAAAAAAAAAAAAAAAAAAAAAAAA">
-                                      <p:cBhvr>
-                                        <p:cTn id="367" dur="2000" fill="hold"/>
+                                    <p:animMotion origin="layout" path="M 0.03034 0.00162 L 0.03034 0.00185 C 0.03255 -0.00139 0.03685 -0.00787 0.03945 -0.00949 C 0.04023 -0.00996 0.04101 -0.01019 0.0418 -0.01088 C 0.04245 -0.01111 0.04297 -0.01181 0.04362 -0.01227 C 0.04414 -0.0125 0.04466 -0.01273 0.04518 -0.01273 C 0.04648 -0.01273 0.04805 -0.0132 0.04909 -0.01227 C 0.04987 -0.01134 0.05 -0.00949 0.05039 -0.0081 C 0.05299 0.00324 0.04909 -0.01111 0.05221 0.00023 C 0.05247 0.00254 0.05286 0.0044 0.05299 0.00671 C 0.05338 0.00949 0.05378 0.01875 0.05391 0.02106 C 0.05351 0.02893 0.05351 0.03704 0.05299 0.04467 C 0.05286 0.04699 0.05234 0.04907 0.05195 0.05116 C 0.0513 0.05393 0.05065 0.05671 0.04987 0.05949 C 0.04896 0.06319 0.0474 0.06574 0.04596 0.06921 C 0.04531 0.07083 0.04479 0.07291 0.04414 0.07477 C 0.04232 0.0794 0.04088 0.08449 0.03867 0.08866 C 0.02747 0.10833 0.03385 0.09815 0.02018 0.1169 C 0.01836 0.11944 0.0168 0.12268 0.01471 0.12477 C 0.00846 0.13125 0.00208 0.13704 -0.00404 0.14421 C -0.00768 0.14838 -0.00885 0.15023 -0.01341 0.15393 C -0.01563 0.15555 -0.0181 0.15671 -0.02044 0.15856 C -0.02162 0.15972 -0.02266 0.1618 -0.02383 0.16273 C -0.02852 0.1669 -0.0332 0.17083 -0.03789 0.17384 C -0.03893 0.17477 -0.03997 0.17546 -0.04102 0.17616 C -0.04284 0.17708 -0.04479 0.17778 -0.04649 0.17893 C -0.05039 0.18102 -0.0543 0.18264 -0.05794 0.18588 C -0.06393 0.19074 -0.07175 0.19768 -0.07774 0.20023 L -0.09388 0.20717 C -0.09544 0.2081 -0.09727 0.20833 -0.09883 0.20949 C -0.10013 0.20995 -0.1013 0.21065 -0.10247 0.21134 C -0.103 0.2118 -0.10339 0.2125 -0.10404 0.21273 C -0.11537 0.21805 -0.11146 0.21643 -0.11992 0.21782 C -0.12122 0.21782 -0.1224 0.21805 -0.12357 0.21829 C -0.12487 0.21875 -0.12604 0.21944 -0.12747 0.21967 C -0.13086 0.22037 -0.13451 0.2206 -0.13789 0.22106 L -0.14258 0.22199 " pathEditMode="relative" rAng="0" ptsTypes="AAAAAAAAAAAAAAAAAAAAAAAAAAAAAAAAAAAAA">
+                                      <p:cBhvr>
+                                        <p:cTn id="307" dur="2000" fill="hold"/>
                                         <p:tgtEl>
                                           <p:spTgt spid="117"/>
                                         </p:tgtEl>
@@ -11894,30 +11267,21 @@
                             </p:childTnLst>
                           </p:cTn>
                         </p:par>
-                      </p:childTnLst>
-                    </p:cTn>
-                  </p:par>
-                  <p:par>
-                    <p:cTn id="368" fill="hold">
-                      <p:stCondLst>
-                        <p:cond delay="indefinite"/>
-                      </p:stCondLst>
-                      <p:childTnLst>
                         <p:par>
-                          <p:cTn id="369" fill="hold">
+                          <p:cTn id="308" fill="hold">
                             <p:stCondLst>
-                              <p:cond delay="0"/>
+                              <p:cond delay="51250"/>
                             </p:stCondLst>
                             <p:childTnLst>
                               <p:par>
-                                <p:cTn id="370" presetID="10" presetClass="entr" presetSubtype="0" fill="hold" grpId="0" nodeType="clickEffect">
+                                <p:cTn id="309" presetID="10" presetClass="entr" presetSubtype="0" fill="hold" grpId="0" nodeType="afterEffect">
                                   <p:stCondLst>
                                     <p:cond delay="0"/>
                                   </p:stCondLst>
                                   <p:childTnLst>
                                     <p:set>
                                       <p:cBhvr>
-                                        <p:cTn id="371" dur="1" fill="hold">
+                                        <p:cTn id="310" dur="1" fill="hold">
                                           <p:stCondLst>
                                             <p:cond delay="0"/>
                                           </p:stCondLst>
@@ -11935,7 +11299,7 @@
                                     </p:set>
                                     <p:animEffect transition="in" filter="fade">
                                       <p:cBhvr>
-                                        <p:cTn id="372" dur="500"/>
+                                        <p:cTn id="311" dur="500"/>
                                         <p:tgtEl>
                                           <p:spTgt spid="166"/>
                                         </p:tgtEl>
@@ -11947,30 +11311,21 @@
                             </p:childTnLst>
                           </p:cTn>
                         </p:par>
-                      </p:childTnLst>
-                    </p:cTn>
-                  </p:par>
-                  <p:par>
-                    <p:cTn id="373" fill="hold">
-                      <p:stCondLst>
-                        <p:cond delay="indefinite"/>
-                      </p:stCondLst>
-                      <p:childTnLst>
                         <p:par>
-                          <p:cTn id="374" fill="hold">
+                          <p:cTn id="312" fill="hold">
                             <p:stCondLst>
-                              <p:cond delay="0"/>
+                              <p:cond delay="51750"/>
                             </p:stCondLst>
                             <p:childTnLst>
                               <p:par>
-                                <p:cTn id="375" presetID="10" presetClass="entr" presetSubtype="0" fill="hold" grpId="0" nodeType="clickEffect">
+                                <p:cTn id="313" presetID="10" presetClass="entr" presetSubtype="0" fill="hold" grpId="0" nodeType="afterEffect">
                                   <p:stCondLst>
                                     <p:cond delay="0"/>
                                   </p:stCondLst>
                                   <p:childTnLst>
                                     <p:set>
                                       <p:cBhvr>
-                                        <p:cTn id="376" dur="1" fill="hold">
+                                        <p:cTn id="314" dur="1" fill="hold">
                                           <p:stCondLst>
                                             <p:cond delay="0"/>
                                           </p:stCondLst>
@@ -11988,7 +11343,7 @@
                                     </p:set>
                                     <p:animEffect transition="in" filter="fade">
                                       <p:cBhvr>
-                                        <p:cTn id="377" dur="500"/>
+                                        <p:cTn id="315" dur="500"/>
                                         <p:tgtEl>
                                           <p:spTgt spid="172"/>
                                         </p:tgtEl>
@@ -12000,30 +11355,21 @@
                             </p:childTnLst>
                           </p:cTn>
                         </p:par>
-                      </p:childTnLst>
-                    </p:cTn>
-                  </p:par>
-                  <p:par>
-                    <p:cTn id="378" fill="hold">
-                      <p:stCondLst>
-                        <p:cond delay="indefinite"/>
-                      </p:stCondLst>
-                      <p:childTnLst>
                         <p:par>
-                          <p:cTn id="379" fill="hold">
+                          <p:cTn id="316" fill="hold">
                             <p:stCondLst>
-                              <p:cond delay="0"/>
+                              <p:cond delay="52250"/>
                             </p:stCondLst>
                             <p:childTnLst>
                               <p:par>
-                                <p:cTn id="380" presetID="10" presetClass="entr" presetSubtype="0" fill="hold" nodeType="clickEffect">
+                                <p:cTn id="317" presetID="10" presetClass="entr" presetSubtype="0" fill="hold" nodeType="afterEffect">
                                   <p:stCondLst>
                                     <p:cond delay="0"/>
                                   </p:stCondLst>
                                   <p:childTnLst>
                                     <p:set>
                                       <p:cBhvr>
-                                        <p:cTn id="381" dur="1" fill="hold">
+                                        <p:cTn id="318" dur="1" fill="hold">
                                           <p:stCondLst>
                                             <p:cond delay="0"/>
                                           </p:stCondLst>
@@ -12041,7 +11387,7 @@
                                     </p:set>
                                     <p:animEffect transition="in" filter="fade">
                                       <p:cBhvr>
-                                        <p:cTn id="382" dur="500"/>
+                                        <p:cTn id="319" dur="500"/>
                                         <p:tgtEl>
                                           <p:spTgt spid="133"/>
                                         </p:tgtEl>
@@ -12053,30 +11399,21 @@
                             </p:childTnLst>
                           </p:cTn>
                         </p:par>
-                      </p:childTnLst>
-                    </p:cTn>
-                  </p:par>
-                  <p:par>
-                    <p:cTn id="383" fill="hold">
-                      <p:stCondLst>
-                        <p:cond delay="indefinite"/>
-                      </p:stCondLst>
-                      <p:childTnLst>
                         <p:par>
-                          <p:cTn id="384" fill="hold">
+                          <p:cTn id="320" fill="hold">
                             <p:stCondLst>
-                              <p:cond delay="0"/>
+                              <p:cond delay="52750"/>
                             </p:stCondLst>
                             <p:childTnLst>
                               <p:par>
-                                <p:cTn id="385" presetID="22" presetClass="entr" presetSubtype="1" fill="hold" nodeType="clickEffect">
+                                <p:cTn id="321" presetID="22" presetClass="entr" presetSubtype="1" fill="hold" nodeType="afterEffect">
                                   <p:stCondLst>
                                     <p:cond delay="0"/>
                                   </p:stCondLst>
                                   <p:childTnLst>
                                     <p:set>
                                       <p:cBhvr>
-                                        <p:cTn id="386" dur="1" fill="hold">
+                                        <p:cTn id="322" dur="1" fill="hold">
                                           <p:stCondLst>
                                             <p:cond delay="0"/>
                                           </p:stCondLst>
@@ -12094,7 +11431,7 @@
                                     </p:set>
                                     <p:animEffect transition="in" filter="wipe(up)">
                                       <p:cBhvr>
-                                        <p:cTn id="387" dur="500"/>
+                                        <p:cTn id="323" dur="500"/>
                                         <p:tgtEl>
                                           <p:spTgt spid="138"/>
                                         </p:tgtEl>
@@ -12106,23 +11443,14 @@
                             </p:childTnLst>
                           </p:cTn>
                         </p:par>
-                      </p:childTnLst>
-                    </p:cTn>
-                  </p:par>
-                  <p:par>
-                    <p:cTn id="388" fill="hold">
-                      <p:stCondLst>
-                        <p:cond delay="indefinite"/>
-                      </p:stCondLst>
-                      <p:childTnLst>
                         <p:par>
-                          <p:cTn id="389" fill="hold">
+                          <p:cTn id="324" fill="hold">
                             <p:stCondLst>
-                              <p:cond delay="0"/>
+                              <p:cond delay="53250"/>
                             </p:stCondLst>
                             <p:childTnLst>
                               <p:par>
-                                <p:cTn id="390" presetID="10" presetClass="entr" presetSubtype="0" fill="hold" nodeType="clickEffect">
+                                <p:cTn id="325" presetID="10" presetClass="entr" presetSubtype="0" fill="hold" nodeType="afterEffect">
                                   <p:stCondLst>
                                     <p:cond delay="0"/>
                                   </p:stCondLst>
@@ -12132,7 +11460,7 @@
                                   <p:childTnLst>
                                     <p:set>
                                       <p:cBhvr>
-                                        <p:cTn id="391" dur="1" fill="hold">
+                                        <p:cTn id="326" dur="1" fill="hold">
                                           <p:stCondLst>
                                             <p:cond delay="0"/>
                                           </p:stCondLst>
@@ -12154,7 +11482,7 @@
                                     </p:set>
                                     <p:animEffect transition="in" filter="fade">
                                       <p:cBhvr>
-                                        <p:cTn id="392" dur="500"/>
+                                        <p:cTn id="327" dur="500"/>
                                         <p:tgtEl>
                                           <p:spTgt spid="140">
                                             <p:txEl>
@@ -12167,8 +11495,17 @@
                                   </p:childTnLst>
                                 </p:cTn>
                               </p:par>
+                            </p:childTnLst>
+                          </p:cTn>
+                        </p:par>
+                        <p:par>
+                          <p:cTn id="328" fill="hold">
+                            <p:stCondLst>
+                              <p:cond delay="53850"/>
+                            </p:stCondLst>
+                            <p:childTnLst>
                               <p:par>
-                                <p:cTn id="393" presetID="10" presetClass="entr" presetSubtype="0" fill="hold" nodeType="withEffect">
+                                <p:cTn id="329" presetID="10" presetClass="entr" presetSubtype="0" fill="hold" nodeType="afterEffect">
                                   <p:stCondLst>
                                     <p:cond delay="0"/>
                                   </p:stCondLst>
@@ -12178,7 +11515,7 @@
                                   <p:childTnLst>
                                     <p:set>
                                       <p:cBhvr>
-                                        <p:cTn id="394" dur="1" fill="hold">
+                                        <p:cTn id="330" dur="1" fill="hold">
                                           <p:stCondLst>
                                             <p:cond delay="0"/>
                                           </p:stCondLst>
@@ -12200,7 +11537,7 @@
                                     </p:set>
                                     <p:animEffect transition="in" filter="fade">
                                       <p:cBhvr>
-                                        <p:cTn id="395" dur="500"/>
+                                        <p:cTn id="331" dur="500"/>
                                         <p:tgtEl>
                                           <p:spTgt spid="140">
                                             <p:txEl>
@@ -12216,30 +11553,21 @@
                             </p:childTnLst>
                           </p:cTn>
                         </p:par>
-                      </p:childTnLst>
-                    </p:cTn>
-                  </p:par>
-                  <p:par>
-                    <p:cTn id="396" fill="hold">
-                      <p:stCondLst>
-                        <p:cond delay="indefinite"/>
-                      </p:stCondLst>
-                      <p:childTnLst>
                         <p:par>
-                          <p:cTn id="397" fill="hold">
+                          <p:cTn id="332" fill="hold">
                             <p:stCondLst>
-                              <p:cond delay="0"/>
+                              <p:cond delay="54350"/>
                             </p:stCondLst>
                             <p:childTnLst>
                               <p:par>
-                                <p:cTn id="398" presetID="10" presetClass="entr" presetSubtype="0" fill="hold" nodeType="clickEffect">
+                                <p:cTn id="333" presetID="10" presetClass="entr" presetSubtype="0" fill="hold" nodeType="afterEffect">
                                   <p:stCondLst>
                                     <p:cond delay="0"/>
                                   </p:stCondLst>
                                   <p:childTnLst>
                                     <p:set>
                                       <p:cBhvr>
-                                        <p:cTn id="399" dur="1" fill="hold">
+                                        <p:cTn id="334" dur="1" fill="hold">
                                           <p:stCondLst>
                                             <p:cond delay="0"/>
                                           </p:stCondLst>
@@ -12257,7 +11585,7 @@
                                     </p:set>
                                     <p:animEffect transition="in" filter="fade">
                                       <p:cBhvr>
-                                        <p:cTn id="400" dur="500"/>
+                                        <p:cTn id="335" dur="500"/>
                                         <p:tgtEl>
                                           <p:spTgt spid="141"/>
                                         </p:tgtEl>
@@ -12269,30 +11597,21 @@
                             </p:childTnLst>
                           </p:cTn>
                         </p:par>
-                      </p:childTnLst>
-                    </p:cTn>
-                  </p:par>
-                  <p:par>
-                    <p:cTn id="401" fill="hold">
-                      <p:stCondLst>
-                        <p:cond delay="indefinite"/>
-                      </p:stCondLst>
-                      <p:childTnLst>
                         <p:par>
-                          <p:cTn id="402" fill="hold">
+                          <p:cTn id="336" fill="hold">
                             <p:stCondLst>
-                              <p:cond delay="0"/>
+                              <p:cond delay="54850"/>
                             </p:stCondLst>
                             <p:childTnLst>
                               <p:par>
-                                <p:cTn id="403" presetID="26" presetClass="emph" presetSubtype="0" fill="hold" nodeType="clickEffect">
+                                <p:cTn id="337" presetID="26" presetClass="emph" presetSubtype="0" fill="hold" nodeType="afterEffect">
                                   <p:stCondLst>
                                     <p:cond delay="0"/>
                                   </p:stCondLst>
                                   <p:childTnLst>
                                     <p:animEffect transition="out" filter="fade">
                                       <p:cBhvr>
-                                        <p:cTn id="404" dur="500" tmFilter="0, 0; .2, .5; .8, .5; 1, 0"/>
+                                        <p:cTn id="338" dur="500" tmFilter="0, 0; .2, .5; .8, .5; 1, 0"/>
                                         <p:tgtEl>
                                           <p:spTgt spid="141"/>
                                         </p:tgtEl>
@@ -12300,13 +11619,60 @@
                                     </p:animEffect>
                                     <p:animScale>
                                       <p:cBhvr>
-                                        <p:cTn id="405" dur="250" autoRev="1" fill="hold"/>
+                                        <p:cTn id="339" dur="250" autoRev="1" fill="hold"/>
                                         <p:tgtEl>
                                           <p:spTgt spid="141"/>
                                         </p:tgtEl>
                                       </p:cBhvr>
                                       <p:by x="105000" y="105000"/>
                                     </p:animScale>
+                                  </p:childTnLst>
+                                </p:cTn>
+                              </p:par>
+                            </p:childTnLst>
+                          </p:cTn>
+                        </p:par>
+                        <p:par>
+                          <p:cTn id="340" fill="hold">
+                            <p:stCondLst>
+                              <p:cond delay="55350"/>
+                            </p:stCondLst>
+                            <p:childTnLst>
+                              <p:par>
+                                <p:cTn id="341" presetID="10" presetClass="entr" presetSubtype="0" fill="hold" grpId="0" nodeType="afterEffect">
+                                  <p:stCondLst>
+                                    <p:cond delay="0"/>
+                                  </p:stCondLst>
+                                  <p:iterate type="lt">
+                                    <p:tmPct val="10000"/>
+                                  </p:iterate>
+                                  <p:childTnLst>
+                                    <p:set>
+                                      <p:cBhvr>
+                                        <p:cTn id="342" dur="1" fill="hold">
+                                          <p:stCondLst>
+                                            <p:cond delay="0"/>
+                                          </p:stCondLst>
+                                        </p:cTn>
+                                        <p:tgtEl>
+                                          <p:spTgt spid="145"/>
+                                        </p:tgtEl>
+                                        <p:attrNameLst>
+                                          <p:attrName>style.visibility</p:attrName>
+                                        </p:attrNameLst>
+                                      </p:cBhvr>
+                                      <p:to>
+                                        <p:strVal val="visible"/>
+                                      </p:to>
+                                    </p:set>
+                                    <p:animEffect transition="in" filter="fade">
+                                      <p:cBhvr>
+                                        <p:cTn id="343" dur="500"/>
+                                        <p:tgtEl>
+                                          <p:spTgt spid="145"/>
+                                        </p:tgtEl>
+                                      </p:cBhvr>
+                                    </p:animEffect>
                                   </p:childTnLst>
                                 </p:cTn>
                               </p:par>
@@ -12363,6 +11729,7 @@
       <p:bldP spid="114" grpId="0" animBg="1"/>
       <p:bldP spid="115" grpId="0" animBg="1"/>
       <p:bldP spid="116" grpId="0" animBg="1"/>
+      <p:bldP spid="145" grpId="0"/>
       <p:bldP spid="146" grpId="0"/>
       <p:bldP spid="148" grpId="0"/>
       <p:bldP spid="163" grpId="0"/>
@@ -12373,6 +11740,8 @@
       <p:bldP spid="170" grpId="0"/>
       <p:bldP spid="171" grpId="0"/>
       <p:bldP spid="172" grpId="0"/>
+      <p:bldP spid="2" grpId="0"/>
+      <p:bldP spid="3" grpId="0"/>
     </p:bldLst>
   </p:timing>
 </p:sld>

</xml_diff>